<commit_message>
Updating the ppt file and adding the placeholders.
</commit_message>
<xml_diff>
--- a/ppt/Seminar - Rohit & Rohit.pptx
+++ b/ppt/Seminar - Rohit & Rohit.pptx
@@ -10,10 +10,10 @@
     <p:sldMasterId id="2147483697" r:id="rId6"/>
   </p:sldMasterIdLst>
   <p:notesMasterIdLst>
-    <p:notesMasterId r:id="rId19"/>
+    <p:notesMasterId r:id="rId35"/>
   </p:notesMasterIdLst>
   <p:handoutMasterIdLst>
-    <p:handoutMasterId r:id="rId20"/>
+    <p:handoutMasterId r:id="rId36"/>
   </p:handoutMasterIdLst>
   <p:sldIdLst>
     <p:sldId id="355" r:id="rId7"/>
@@ -27,7 +27,23 @@
     <p:sldId id="399" r:id="rId15"/>
     <p:sldId id="400" r:id="rId16"/>
     <p:sldId id="401" r:id="rId17"/>
-    <p:sldId id="356" r:id="rId18"/>
+    <p:sldId id="402" r:id="rId18"/>
+    <p:sldId id="403" r:id="rId19"/>
+    <p:sldId id="404" r:id="rId20"/>
+    <p:sldId id="405" r:id="rId21"/>
+    <p:sldId id="406" r:id="rId22"/>
+    <p:sldId id="407" r:id="rId23"/>
+    <p:sldId id="408" r:id="rId24"/>
+    <p:sldId id="409" r:id="rId25"/>
+    <p:sldId id="410" r:id="rId26"/>
+    <p:sldId id="412" r:id="rId27"/>
+    <p:sldId id="411" r:id="rId28"/>
+    <p:sldId id="413" r:id="rId29"/>
+    <p:sldId id="414" r:id="rId30"/>
+    <p:sldId id="415" r:id="rId31"/>
+    <p:sldId id="416" r:id="rId32"/>
+    <p:sldId id="417" r:id="rId33"/>
+    <p:sldId id="356" r:id="rId34"/>
   </p:sldIdLst>
   <p:sldSz cx="9144000" cy="6858000" type="screen4x3"/>
   <p:notesSz cx="9925050" cy="6665913"/>
@@ -322,7 +338,7 @@
               <a:pPr>
                 <a:defRPr/>
               </a:pPr>
-              <a:t>24/01/2018</a:t>
+              <a:t>25/01/2018</a:t>
             </a:fld>
             <a:endParaRPr lang="en-GB" dirty="0"/>
           </a:p>
@@ -7752,57 +7768,16 @@
             </a:pPr>
             <a:r>
               <a:rPr lang="en-IN" sz="2000" dirty="0"/>
-              <a:t>Anti Ad-blocker scripts change HTML content by:</a:t>
-            </a:r>
-          </a:p>
-          <a:p>
-            <a:pPr marL="519113" lvl="1" indent="-342900">
-              <a:lnSpc>
-                <a:spcPct val="100000"/>
-              </a:lnSpc>
-              <a:buFont typeface="Arial" panose="020B0604020202020204" pitchFamily="34" charset="0"/>
-              <a:buChar char="•"/>
-            </a:pPr>
-            <a:r>
-              <a:rPr lang="en-IN" sz="1800" dirty="0"/>
-              <a:t>adding extra HTML elements,</a:t>
-            </a:r>
-          </a:p>
-          <a:p>
-            <a:pPr marL="519113" lvl="1" indent="-342900">
-              <a:lnSpc>
-                <a:spcPct val="100000"/>
-              </a:lnSpc>
-              <a:buFont typeface="Arial" panose="020B0604020202020204" pitchFamily="34" charset="0"/>
-              <a:buChar char="•"/>
-            </a:pPr>
-            <a:r>
-              <a:rPr lang="en-IN" sz="1800" dirty="0"/>
-              <a:t>change in style of existing HTML elements,</a:t>
-            </a:r>
-          </a:p>
-          <a:p>
-            <a:pPr marL="519113" lvl="1" indent="-342900">
-              <a:lnSpc>
-                <a:spcPct val="100000"/>
-              </a:lnSpc>
-              <a:buFont typeface="Arial" panose="020B0604020202020204" pitchFamily="34" charset="0"/>
-              <a:buChar char="•"/>
-            </a:pPr>
-            <a:r>
-              <a:rPr lang="en-IN" sz="1800" dirty="0"/>
-              <a:t>changes in textual context.</a:t>
-            </a:r>
-          </a:p>
-          <a:p>
-            <a:pPr marL="519113" lvl="1" indent="-342900">
-              <a:lnSpc>
-                <a:spcPct val="100000"/>
-              </a:lnSpc>
-              <a:buFont typeface="Arial" panose="020B0604020202020204" pitchFamily="34" charset="0"/>
-              <a:buChar char="•"/>
-            </a:pPr>
-            <a:endParaRPr lang="en-IN" sz="1800" dirty="0"/>
+              <a:t>We make use of Selenium Chrome </a:t>
+            </a:r>
+            <a:r>
+              <a:rPr lang="en-IN" sz="2000" dirty="0" err="1"/>
+              <a:t>Webdriver</a:t>
+            </a:r>
+            <a:r>
+              <a:rPr lang="en-IN" sz="2000" dirty="0"/>
+              <a:t> to launch two separate instances of Google Chrome.</a:t>
+            </a:r>
           </a:p>
           <a:p>
             <a:pPr marL="342900" indent="-342900">
@@ -7812,13 +7787,10 @@
               <a:buFont typeface="Arial" panose="020B0604020202020204" pitchFamily="34" charset="0"/>
               <a:buChar char="•"/>
             </a:pPr>
-            <a:r>
-              <a:rPr lang="en-IN" sz="1800" dirty="0"/>
-              <a:t>These changes can be categorized into:</a:t>
-            </a:r>
-          </a:p>
-          <a:p>
-            <a:pPr marL="519113" lvl="1" indent="-342900">
+            <a:endParaRPr lang="en-IN" sz="2000" dirty="0"/>
+          </a:p>
+          <a:p>
+            <a:pPr marL="342900" indent="-342900">
               <a:lnSpc>
                 <a:spcPct val="100000"/>
               </a:lnSpc>
@@ -7826,33 +7798,30 @@
               <a:buChar char="•"/>
             </a:pPr>
             <a:r>
-              <a:rPr lang="en-IN" sz="1800" i="1" dirty="0"/>
-              <a:t>Node Changes</a:t>
-            </a:r>
-            <a:r>
-              <a:rPr lang="en-IN" sz="1800" dirty="0"/>
-              <a:t>: Extra DOM elements</a:t>
-            </a:r>
-          </a:p>
-          <a:p>
-            <a:pPr marL="519113" lvl="1" indent="-342900">
+              <a:rPr lang="en-IN" sz="2000" dirty="0"/>
+              <a:t>Instance A is launched with </a:t>
+            </a:r>
+            <a:r>
+              <a:rPr lang="en-IN" sz="2000" dirty="0" err="1"/>
+              <a:t>Adblock</a:t>
+            </a:r>
+            <a:r>
+              <a:rPr lang="en-IN" sz="2000" dirty="0"/>
+              <a:t> Plus extension and instance B is without any extension.</a:t>
+            </a:r>
+          </a:p>
+          <a:p>
+            <a:pPr marL="342900" indent="-342900">
               <a:lnSpc>
                 <a:spcPct val="100000"/>
               </a:lnSpc>
               <a:buFont typeface="Arial" panose="020B0604020202020204" pitchFamily="34" charset="0"/>
               <a:buChar char="•"/>
             </a:pPr>
-            <a:r>
-              <a:rPr lang="en-IN" sz="1800" i="1" dirty="0"/>
-              <a:t>Style Changes</a:t>
-            </a:r>
-            <a:r>
-              <a:rPr lang="en-IN" sz="1800" dirty="0"/>
-              <a:t>: Toggling of hidden div elements</a:t>
-            </a:r>
-          </a:p>
-          <a:p>
-            <a:pPr marL="519113" lvl="1" indent="-342900">
+            <a:endParaRPr lang="en-IN" sz="2000" dirty="0"/>
+          </a:p>
+          <a:p>
+            <a:pPr marL="342900" indent="-342900">
               <a:lnSpc>
                 <a:spcPct val="100000"/>
               </a:lnSpc>
@@ -7860,29 +7829,78 @@
               <a:buChar char="•"/>
             </a:pPr>
             <a:r>
-              <a:rPr lang="en-IN" sz="1800" i="1" dirty="0"/>
-              <a:t>Textual Changes</a:t>
-            </a:r>
-            <a:r>
-              <a:rPr lang="en-IN" sz="1800" dirty="0"/>
-              <a:t>: Changes in textual content</a:t>
-            </a:r>
-          </a:p>
-          <a:p>
-            <a:pPr marL="519113" lvl="1" indent="-342900">
+              <a:rPr lang="en-IN" sz="2000" dirty="0"/>
+              <a:t>Instances are compared w.r.t Node Features (div, h1, h2, h3, </a:t>
+            </a:r>
+            <a:r>
+              <a:rPr lang="en-IN" sz="2000" dirty="0" err="1"/>
+              <a:t>img</a:t>
+            </a:r>
+            <a:r>
+              <a:rPr lang="en-IN" sz="2000" dirty="0"/>
+              <a:t>, table, p, </a:t>
+            </a:r>
+            <a:r>
+              <a:rPr lang="en-IN" sz="2000" dirty="0" err="1"/>
+              <a:t>iframe</a:t>
+            </a:r>
+            <a:r>
+              <a:rPr lang="en-IN" sz="2000" dirty="0"/>
+              <a:t> and text nodes), Textual Features (#lines, #words, #text) and Structural Features (URL redirection).</a:t>
+            </a:r>
+          </a:p>
+          <a:p>
+            <a:pPr marL="342900" indent="-342900">
               <a:lnSpc>
                 <a:spcPct val="100000"/>
               </a:lnSpc>
               <a:buFont typeface="Arial" panose="020B0604020202020204" pitchFamily="34" charset="0"/>
               <a:buChar char="•"/>
             </a:pPr>
-            <a:r>
-              <a:rPr lang="en-IN" sz="1800" i="1" dirty="0"/>
-              <a:t>Structural Changes</a:t>
-            </a:r>
-            <a:r>
-              <a:rPr lang="en-IN" sz="1800" dirty="0"/>
-              <a:t>: URL redirections</a:t>
+            <a:endParaRPr lang="en-IN" sz="2000" dirty="0"/>
+          </a:p>
+          <a:p>
+            <a:pPr marL="342900" indent="-342900">
+              <a:lnSpc>
+                <a:spcPct val="100000"/>
+              </a:lnSpc>
+              <a:buFont typeface="Arial" panose="020B0604020202020204" pitchFamily="34" charset="0"/>
+              <a:buChar char="•"/>
+            </a:pPr>
+            <a:r>
+              <a:rPr lang="en-IN" sz="2000" dirty="0"/>
+              <a:t>These features are compared using a Python script and </a:t>
+            </a:r>
+            <a:r>
+              <a:rPr lang="en-IN" sz="2000" dirty="0" err="1"/>
+              <a:t>BeautifulSoup</a:t>
+            </a:r>
+            <a:r>
+              <a:rPr lang="en-IN" sz="2000" dirty="0"/>
+              <a:t> library is used for screen scraping.</a:t>
+            </a:r>
+          </a:p>
+          <a:p>
+            <a:pPr marL="342900" indent="-342900">
+              <a:lnSpc>
+                <a:spcPct val="100000"/>
+              </a:lnSpc>
+              <a:buFont typeface="Arial" panose="020B0604020202020204" pitchFamily="34" charset="0"/>
+              <a:buChar char="•"/>
+            </a:pPr>
+            <a:endParaRPr lang="en-IN" sz="2000" dirty="0"/>
+          </a:p>
+          <a:p>
+            <a:pPr marL="342900" indent="-342900">
+              <a:lnSpc>
+                <a:spcPct val="100000"/>
+              </a:lnSpc>
+              <a:buFont typeface="Arial" panose="020B0604020202020204" pitchFamily="34" charset="0"/>
+              <a:buChar char="•"/>
+            </a:pPr>
+            <a:r>
+              <a:rPr lang="en-IN" sz="2000" dirty="0"/>
+              <a:t>These features are stored in a .csv file.</a:t>
             </a:r>
           </a:p>
         </p:txBody>
@@ -7946,7 +7964,95 @@
       </p:grpSpPr>
       <p:sp>
         <p:nvSpPr>
-          <p:cNvPr id="5" name="Titel 4"/>
+          <p:cNvPr id="2" name="Inhaltsplatzhalter 1"/>
+          <p:cNvSpPr>
+            <a:spLocks noGrp="1"/>
+          </p:cNvSpPr>
+          <p:nvPr>
+            <p:ph idx="1"/>
+          </p:nvPr>
+        </p:nvSpPr>
+        <p:spPr>
+          <a:xfrm>
+            <a:off x="319090" y="1762188"/>
+            <a:ext cx="8508999" cy="4436953"/>
+          </a:xfrm>
+        </p:spPr>
+        <p:txBody>
+          <a:bodyPr/>
+          <a:lstStyle/>
+          <a:p>
+            <a:pPr marL="342900" indent="-342900">
+              <a:lnSpc>
+                <a:spcPct val="150000"/>
+              </a:lnSpc>
+              <a:buFont typeface="Arial" panose="020B0604020202020204" pitchFamily="34" charset="0"/>
+              <a:buChar char="•"/>
+            </a:pPr>
+            <a:r>
+              <a:rPr lang="en-IN" sz="2000" dirty="0"/>
+              <a:t>We use three Machine Learning classifiers: J48 Decision Tree, Random Forest and Naive Bayes to identify websites that employ anti Ad-blockers.</a:t>
+            </a:r>
+          </a:p>
+          <a:p>
+            <a:pPr marL="342900" indent="-342900">
+              <a:lnSpc>
+                <a:spcPct val="150000"/>
+              </a:lnSpc>
+              <a:buFont typeface="Arial" panose="020B0604020202020204" pitchFamily="34" charset="0"/>
+              <a:buChar char="•"/>
+            </a:pPr>
+            <a:endParaRPr lang="en-IN" sz="2000" dirty="0"/>
+          </a:p>
+          <a:p>
+            <a:pPr marL="342900" indent="-342900">
+              <a:lnSpc>
+                <a:spcPct val="150000"/>
+              </a:lnSpc>
+              <a:buFont typeface="Arial" panose="020B0604020202020204" pitchFamily="34" charset="0"/>
+              <a:buChar char="•"/>
+            </a:pPr>
+            <a:r>
+              <a:rPr lang="en-IN" sz="2000" dirty="0"/>
+              <a:t>We collected positive samples (websites that employ Anti Ad-blockers) and negative samples (website that do not employ Anti Ad-blockers) from sources such as anti-</a:t>
+            </a:r>
+            <a:r>
+              <a:rPr lang="en-IN" sz="2000" dirty="0" err="1"/>
+              <a:t>adblock</a:t>
+            </a:r>
+            <a:r>
+              <a:rPr lang="en-IN" sz="2000" dirty="0"/>
+              <a:t>-killer list and Alexa top-100 websites.</a:t>
+            </a:r>
+          </a:p>
+          <a:p>
+            <a:pPr marL="342900" indent="-342900">
+              <a:lnSpc>
+                <a:spcPct val="150000"/>
+              </a:lnSpc>
+              <a:buFont typeface="Arial" panose="020B0604020202020204" pitchFamily="34" charset="0"/>
+              <a:buChar char="•"/>
+            </a:pPr>
+            <a:endParaRPr lang="en-IN" sz="2000" dirty="0"/>
+          </a:p>
+          <a:p>
+            <a:pPr marL="342900" indent="-342900">
+              <a:lnSpc>
+                <a:spcPct val="150000"/>
+              </a:lnSpc>
+              <a:buFont typeface="Arial" panose="020B0604020202020204" pitchFamily="34" charset="0"/>
+              <a:buChar char="•"/>
+            </a:pPr>
+            <a:r>
+              <a:rPr lang="en-IN" sz="2000" dirty="0"/>
+              <a:t>Information gain ratio is used for the features extracted for which learning and prediction needs to be done.</a:t>
+            </a:r>
+          </a:p>
+        </p:txBody>
+      </p:sp>
+      <p:sp>
+        <p:nvSpPr>
+          <p:cNvPr id="3" name="Titel 2"/>
           <p:cNvSpPr>
             <a:spLocks noGrp="1"/>
           </p:cNvSpPr>
@@ -7955,23 +8061,775 @@
           </p:nvPr>
         </p:nvSpPr>
         <p:spPr>
+          <a:prstGeom prst="rect">
+            <a:avLst/>
+          </a:prstGeom>
+        </p:spPr>
+        <p:txBody>
+          <a:bodyPr/>
+          <a:lstStyle/>
+          <a:p>
+            <a:r>
+              <a:rPr lang="en-IN" sz="3000" dirty="0"/>
+              <a:t>Detecting Anti Ad-blockers: Model Training</a:t>
+            </a:r>
+            <a:endParaRPr lang="de-DE" sz="3000" dirty="0"/>
+          </a:p>
+        </p:txBody>
+      </p:sp>
+    </p:spTree>
+    <p:extLst>
+      <p:ext uri="{BB962C8B-B14F-4D97-AF65-F5344CB8AC3E}">
+        <p14:creationId xmlns:p14="http://schemas.microsoft.com/office/powerpoint/2010/main" val="1978283017"/>
+      </p:ext>
+    </p:extLst>
+  </p:cSld>
+  <p:clrMapOvr>
+    <a:masterClrMapping/>
+  </p:clrMapOvr>
+</p:sld>
+</file>
+
+<file path=ppt/slides/slide13.xml><?xml version="1.0" encoding="utf-8"?>
+<p:sld xmlns:a="http://schemas.openxmlformats.org/drawingml/2006/main" xmlns:r="http://schemas.openxmlformats.org/officeDocument/2006/relationships" xmlns:p="http://schemas.openxmlformats.org/presentationml/2006/main">
+  <p:cSld>
+    <p:spTree>
+      <p:nvGrpSpPr>
+        <p:cNvPr id="1" name=""/>
+        <p:cNvGrpSpPr/>
+        <p:nvPr/>
+      </p:nvGrpSpPr>
+      <p:grpSpPr>
+        <a:xfrm>
+          <a:off x="0" y="0"/>
+          <a:ext cx="0" cy="0"/>
+          <a:chOff x="0" y="0"/>
+          <a:chExt cx="0" cy="0"/>
+        </a:xfrm>
+      </p:grpSpPr>
+      <p:sp>
+        <p:nvSpPr>
+          <p:cNvPr id="2" name="Inhaltsplatzhalter 1"/>
+          <p:cNvSpPr>
+            <a:spLocks noGrp="1"/>
+          </p:cNvSpPr>
+          <p:nvPr>
+            <p:ph idx="1"/>
+          </p:nvPr>
+        </p:nvSpPr>
+        <p:spPr>
           <a:xfrm>
-            <a:off x="1695945" y="3138444"/>
-            <a:ext cx="8508999" cy="501650"/>
+            <a:off x="319090" y="1762188"/>
+            <a:ext cx="8508999" cy="4436953"/>
           </a:xfrm>
         </p:spPr>
         <p:txBody>
           <a:bodyPr/>
           <a:lstStyle/>
           <a:p>
-            <a:r>
-              <a:rPr lang="en-IN" dirty="0"/>
-              <a:t>Thank you!</a:t>
-            </a:r>
+            <a:pPr marL="342900" indent="-342900">
+              <a:lnSpc>
+                <a:spcPct val="100000"/>
+              </a:lnSpc>
+              <a:buFont typeface="Arial" panose="020B0604020202020204" pitchFamily="34" charset="0"/>
+              <a:buChar char="•"/>
+            </a:pPr>
+            <a:r>
+              <a:rPr lang="en-IN" sz="2000" dirty="0"/>
+              <a:t>C4.5 Algorithm (J48 Decision Tree) uses a decision tree evaluation where each branch with the highest normalized information gain is chosen to make a decision.</a:t>
+            </a:r>
+          </a:p>
+          <a:p>
+            <a:pPr marL="342900" indent="-342900">
+              <a:lnSpc>
+                <a:spcPct val="100000"/>
+              </a:lnSpc>
+              <a:buFont typeface="Arial" panose="020B0604020202020204" pitchFamily="34" charset="0"/>
+              <a:buChar char="•"/>
+            </a:pPr>
+            <a:endParaRPr lang="en-IN" sz="2000" dirty="0"/>
+          </a:p>
+          <a:p>
+            <a:pPr marL="342900" indent="-342900">
+              <a:lnSpc>
+                <a:spcPct val="100000"/>
+              </a:lnSpc>
+              <a:buFont typeface="Arial" panose="020B0604020202020204" pitchFamily="34" charset="0"/>
+              <a:buChar char="•"/>
+            </a:pPr>
+            <a:r>
+              <a:rPr lang="en-IN" sz="2000" dirty="0"/>
+              <a:t>Bayes Naive applies Bayes' theorem with strong (naive) independence assumptions between the features. </a:t>
+            </a:r>
+          </a:p>
+          <a:p>
+            <a:pPr marL="342900" indent="-342900">
+              <a:lnSpc>
+                <a:spcPct val="100000"/>
+              </a:lnSpc>
+              <a:buFont typeface="Arial" panose="020B0604020202020204" pitchFamily="34" charset="0"/>
+              <a:buChar char="•"/>
+            </a:pPr>
+            <a:endParaRPr lang="en-IN" sz="2000" dirty="0"/>
+          </a:p>
+          <a:p>
+            <a:pPr marL="342900" indent="-342900">
+              <a:lnSpc>
+                <a:spcPct val="100000"/>
+              </a:lnSpc>
+              <a:buFont typeface="Arial" panose="020B0604020202020204" pitchFamily="34" charset="0"/>
+              <a:buChar char="•"/>
+            </a:pPr>
+            <a:r>
+              <a:rPr lang="en-IN" sz="2000" dirty="0"/>
+              <a:t>Random Forest Classifier is used for classification, regression and other tasks, that operate by constructing a multitude of decision trees at training time and outputting the class that is the mode of the classes (classification) or mean prediction (regression) of the individual trees.</a:t>
+            </a:r>
+          </a:p>
+        </p:txBody>
+      </p:sp>
+      <p:sp>
+        <p:nvSpPr>
+          <p:cNvPr id="3" name="Titel 2"/>
+          <p:cNvSpPr>
+            <a:spLocks noGrp="1"/>
+          </p:cNvSpPr>
+          <p:nvPr>
+            <p:ph type="title"/>
+          </p:nvPr>
+        </p:nvSpPr>
+        <p:spPr>
+          <a:prstGeom prst="rect">
+            <a:avLst/>
+          </a:prstGeom>
+        </p:spPr>
+        <p:txBody>
+          <a:bodyPr/>
+          <a:lstStyle/>
+          <a:p>
+            <a:r>
+              <a:rPr lang="en-IN" sz="3000" dirty="0"/>
+              <a:t>Detecting Anti Ad-blockers: Classifier Evaluation</a:t>
+            </a:r>
+            <a:endParaRPr lang="de-DE" sz="3000" dirty="0"/>
           </a:p>
         </p:txBody>
       </p:sp>
     </p:spTree>
+    <p:extLst>
+      <p:ext uri="{BB962C8B-B14F-4D97-AF65-F5344CB8AC3E}">
+        <p14:creationId xmlns:p14="http://schemas.microsoft.com/office/powerpoint/2010/main" val="2104653347"/>
+      </p:ext>
+    </p:extLst>
+  </p:cSld>
+  <p:clrMapOvr>
+    <a:masterClrMapping/>
+  </p:clrMapOvr>
+</p:sld>
+</file>
+
+<file path=ppt/slides/slide14.xml><?xml version="1.0" encoding="utf-8"?>
+<p:sld xmlns:a="http://schemas.openxmlformats.org/drawingml/2006/main" xmlns:r="http://schemas.openxmlformats.org/officeDocument/2006/relationships" xmlns:p="http://schemas.openxmlformats.org/presentationml/2006/main">
+  <p:cSld>
+    <p:spTree>
+      <p:nvGrpSpPr>
+        <p:cNvPr id="1" name=""/>
+        <p:cNvGrpSpPr/>
+        <p:nvPr/>
+      </p:nvGrpSpPr>
+      <p:grpSpPr>
+        <a:xfrm>
+          <a:off x="0" y="0"/>
+          <a:ext cx="0" cy="0"/>
+          <a:chOff x="0" y="0"/>
+          <a:chExt cx="0" cy="0"/>
+        </a:xfrm>
+      </p:grpSpPr>
+      <p:sp>
+        <p:nvSpPr>
+          <p:cNvPr id="2" name="Inhaltsplatzhalter 1"/>
+          <p:cNvSpPr>
+            <a:spLocks noGrp="1"/>
+          </p:cNvSpPr>
+          <p:nvPr>
+            <p:ph idx="1"/>
+          </p:nvPr>
+        </p:nvSpPr>
+        <p:spPr>
+          <a:xfrm>
+            <a:off x="319090" y="1762188"/>
+            <a:ext cx="8508999" cy="4436953"/>
+          </a:xfrm>
+        </p:spPr>
+        <p:txBody>
+          <a:bodyPr/>
+          <a:lstStyle/>
+          <a:p>
+            <a:pPr marL="342900" indent="-342900">
+              <a:lnSpc>
+                <a:spcPct val="100000"/>
+              </a:lnSpc>
+              <a:buFont typeface="Arial" panose="020B0604020202020204" pitchFamily="34" charset="0"/>
+              <a:buChar char="•"/>
+            </a:pPr>
+            <a:r>
+              <a:rPr lang="en-IN" sz="2000" dirty="0"/>
+              <a:t>Decision Tree visualization for Anti Ad-blockers:</a:t>
+            </a:r>
+          </a:p>
+        </p:txBody>
+      </p:sp>
+      <p:sp>
+        <p:nvSpPr>
+          <p:cNvPr id="3" name="Titel 2"/>
+          <p:cNvSpPr>
+            <a:spLocks noGrp="1"/>
+          </p:cNvSpPr>
+          <p:nvPr>
+            <p:ph type="title"/>
+          </p:nvPr>
+        </p:nvSpPr>
+        <p:spPr>
+          <a:prstGeom prst="rect">
+            <a:avLst/>
+          </a:prstGeom>
+        </p:spPr>
+        <p:txBody>
+          <a:bodyPr/>
+          <a:lstStyle/>
+          <a:p>
+            <a:r>
+              <a:rPr lang="en-IN" sz="3000" dirty="0"/>
+              <a:t>Detecting Anti Ad-blockers: Classifier Evaluation</a:t>
+            </a:r>
+            <a:endParaRPr lang="de-DE" sz="3000" dirty="0"/>
+          </a:p>
+        </p:txBody>
+      </p:sp>
+      <p:pic>
+        <p:nvPicPr>
+          <p:cNvPr id="5" name="Picture 4"/>
+          <p:cNvPicPr>
+            <a:picLocks noChangeAspect="1"/>
+          </p:cNvPicPr>
+          <p:nvPr/>
+        </p:nvPicPr>
+        <p:blipFill>
+          <a:blip r:embed="rId2"/>
+          <a:stretch>
+            <a:fillRect/>
+          </a:stretch>
+        </p:blipFill>
+        <p:spPr>
+          <a:xfrm>
+            <a:off x="591128" y="2173641"/>
+            <a:ext cx="8044873" cy="4467989"/>
+          </a:xfrm>
+          <a:prstGeom prst="rect">
+            <a:avLst/>
+          </a:prstGeom>
+        </p:spPr>
+      </p:pic>
+    </p:spTree>
+    <p:extLst>
+      <p:ext uri="{BB962C8B-B14F-4D97-AF65-F5344CB8AC3E}">
+        <p14:creationId xmlns:p14="http://schemas.microsoft.com/office/powerpoint/2010/main" val="1821201377"/>
+      </p:ext>
+    </p:extLst>
+  </p:cSld>
+  <p:clrMapOvr>
+    <a:masterClrMapping/>
+  </p:clrMapOvr>
+</p:sld>
+</file>
+
+<file path=ppt/slides/slide15.xml><?xml version="1.0" encoding="utf-8"?>
+<p:sld xmlns:a="http://schemas.openxmlformats.org/drawingml/2006/main" xmlns:r="http://schemas.openxmlformats.org/officeDocument/2006/relationships" xmlns:p="http://schemas.openxmlformats.org/presentationml/2006/main">
+  <p:cSld>
+    <p:spTree>
+      <p:nvGrpSpPr>
+        <p:cNvPr id="1" name=""/>
+        <p:cNvGrpSpPr/>
+        <p:nvPr/>
+      </p:nvGrpSpPr>
+      <p:grpSpPr>
+        <a:xfrm>
+          <a:off x="0" y="0"/>
+          <a:ext cx="0" cy="0"/>
+          <a:chOff x="0" y="0"/>
+          <a:chExt cx="0" cy="0"/>
+        </a:xfrm>
+      </p:grpSpPr>
+      <p:sp>
+        <p:nvSpPr>
+          <p:cNvPr id="2" name="Inhaltsplatzhalter 1"/>
+          <p:cNvSpPr>
+            <a:spLocks noGrp="1"/>
+          </p:cNvSpPr>
+          <p:nvPr>
+            <p:ph idx="1"/>
+          </p:nvPr>
+        </p:nvSpPr>
+        <p:spPr>
+          <a:xfrm>
+            <a:off x="319090" y="1762188"/>
+            <a:ext cx="8508999" cy="4436953"/>
+          </a:xfrm>
+        </p:spPr>
+        <p:txBody>
+          <a:bodyPr/>
+          <a:lstStyle/>
+          <a:p>
+            <a:pPr marL="342900" indent="-342900">
+              <a:lnSpc>
+                <a:spcPct val="100000"/>
+              </a:lnSpc>
+              <a:buFont typeface="Arial" panose="020B0604020202020204" pitchFamily="34" charset="0"/>
+              <a:buChar char="•"/>
+            </a:pPr>
+            <a:r>
+              <a:rPr lang="en-IN" sz="2000" dirty="0"/>
+              <a:t>Which classifier is the best…</a:t>
+            </a:r>
+          </a:p>
+        </p:txBody>
+      </p:sp>
+      <p:sp>
+        <p:nvSpPr>
+          <p:cNvPr id="3" name="Titel 2"/>
+          <p:cNvSpPr>
+            <a:spLocks noGrp="1"/>
+          </p:cNvSpPr>
+          <p:nvPr>
+            <p:ph type="title"/>
+          </p:nvPr>
+        </p:nvSpPr>
+        <p:spPr>
+          <a:prstGeom prst="rect">
+            <a:avLst/>
+          </a:prstGeom>
+        </p:spPr>
+        <p:txBody>
+          <a:bodyPr/>
+          <a:lstStyle/>
+          <a:p>
+            <a:r>
+              <a:rPr lang="en-IN" sz="3000" dirty="0"/>
+              <a:t>Datasets and Results</a:t>
+            </a:r>
+            <a:endParaRPr lang="de-DE" sz="3000" dirty="0"/>
+          </a:p>
+        </p:txBody>
+      </p:sp>
+    </p:spTree>
+    <p:extLst>
+      <p:ext uri="{BB962C8B-B14F-4D97-AF65-F5344CB8AC3E}">
+        <p14:creationId xmlns:p14="http://schemas.microsoft.com/office/powerpoint/2010/main" val="2828838918"/>
+      </p:ext>
+    </p:extLst>
+  </p:cSld>
+  <p:clrMapOvr>
+    <a:masterClrMapping/>
+  </p:clrMapOvr>
+</p:sld>
+</file>
+
+<file path=ppt/slides/slide16.xml><?xml version="1.0" encoding="utf-8"?>
+<p:sld xmlns:a="http://schemas.openxmlformats.org/drawingml/2006/main" xmlns:r="http://schemas.openxmlformats.org/officeDocument/2006/relationships" xmlns:p="http://schemas.openxmlformats.org/presentationml/2006/main">
+  <p:cSld>
+    <p:spTree>
+      <p:nvGrpSpPr>
+        <p:cNvPr id="1" name=""/>
+        <p:cNvGrpSpPr/>
+        <p:nvPr/>
+      </p:nvGrpSpPr>
+      <p:grpSpPr>
+        <a:xfrm>
+          <a:off x="0" y="0"/>
+          <a:ext cx="0" cy="0"/>
+          <a:chOff x="0" y="0"/>
+          <a:chExt cx="0" cy="0"/>
+        </a:xfrm>
+      </p:grpSpPr>
+      <p:sp>
+        <p:nvSpPr>
+          <p:cNvPr id="2" name="Inhaltsplatzhalter 1"/>
+          <p:cNvSpPr>
+            <a:spLocks noGrp="1"/>
+          </p:cNvSpPr>
+          <p:nvPr>
+            <p:ph idx="1"/>
+          </p:nvPr>
+        </p:nvSpPr>
+        <p:spPr>
+          <a:xfrm>
+            <a:off x="319090" y="1762188"/>
+            <a:ext cx="8508999" cy="4436953"/>
+          </a:xfrm>
+        </p:spPr>
+        <p:txBody>
+          <a:bodyPr/>
+          <a:lstStyle/>
+          <a:p>
+            <a:pPr marL="342900" indent="-342900">
+              <a:lnSpc>
+                <a:spcPct val="100000"/>
+              </a:lnSpc>
+              <a:buFont typeface="Arial" panose="020B0604020202020204" pitchFamily="34" charset="0"/>
+              <a:buChar char="•"/>
+            </a:pPr>
+            <a:r>
+              <a:rPr lang="en-IN" sz="2000" dirty="0"/>
+              <a:t>Germany vs US comparisons…</a:t>
+            </a:r>
+          </a:p>
+        </p:txBody>
+      </p:sp>
+      <p:sp>
+        <p:nvSpPr>
+          <p:cNvPr id="3" name="Titel 2"/>
+          <p:cNvSpPr>
+            <a:spLocks noGrp="1"/>
+          </p:cNvSpPr>
+          <p:nvPr>
+            <p:ph type="title"/>
+          </p:nvPr>
+        </p:nvSpPr>
+        <p:spPr>
+          <a:prstGeom prst="rect">
+            <a:avLst/>
+          </a:prstGeom>
+        </p:spPr>
+        <p:txBody>
+          <a:bodyPr/>
+          <a:lstStyle/>
+          <a:p>
+            <a:r>
+              <a:rPr lang="en-IN" sz="3000" dirty="0"/>
+              <a:t>Datasets and Results: Geographical Comparison</a:t>
+            </a:r>
+            <a:endParaRPr lang="de-DE" sz="3000" dirty="0"/>
+          </a:p>
+        </p:txBody>
+      </p:sp>
+    </p:spTree>
+    <p:extLst>
+      <p:ext uri="{BB962C8B-B14F-4D97-AF65-F5344CB8AC3E}">
+        <p14:creationId xmlns:p14="http://schemas.microsoft.com/office/powerpoint/2010/main" val="2676196641"/>
+      </p:ext>
+    </p:extLst>
+  </p:cSld>
+  <p:clrMapOvr>
+    <a:masterClrMapping/>
+  </p:clrMapOvr>
+</p:sld>
+</file>
+
+<file path=ppt/slides/slide17.xml><?xml version="1.0" encoding="utf-8"?>
+<p:sld xmlns:a="http://schemas.openxmlformats.org/drawingml/2006/main" xmlns:r="http://schemas.openxmlformats.org/officeDocument/2006/relationships" xmlns:p="http://schemas.openxmlformats.org/presentationml/2006/main">
+  <p:cSld>
+    <p:spTree>
+      <p:nvGrpSpPr>
+        <p:cNvPr id="1" name=""/>
+        <p:cNvGrpSpPr/>
+        <p:nvPr/>
+      </p:nvGrpSpPr>
+      <p:grpSpPr>
+        <a:xfrm>
+          <a:off x="0" y="0"/>
+          <a:ext cx="0" cy="0"/>
+          <a:chOff x="0" y="0"/>
+          <a:chExt cx="0" cy="0"/>
+        </a:xfrm>
+      </p:grpSpPr>
+      <p:sp>
+        <p:nvSpPr>
+          <p:cNvPr id="2" name="Inhaltsplatzhalter 1"/>
+          <p:cNvSpPr>
+            <a:spLocks noGrp="1"/>
+          </p:cNvSpPr>
+          <p:nvPr>
+            <p:ph idx="1"/>
+          </p:nvPr>
+        </p:nvSpPr>
+        <p:spPr>
+          <a:xfrm>
+            <a:off x="319090" y="1762188"/>
+            <a:ext cx="8508999" cy="4436953"/>
+          </a:xfrm>
+        </p:spPr>
+        <p:txBody>
+          <a:bodyPr/>
+          <a:lstStyle/>
+          <a:p>
+            <a:pPr marL="342900" indent="-342900">
+              <a:lnSpc>
+                <a:spcPct val="100000"/>
+              </a:lnSpc>
+              <a:buFont typeface="Arial" panose="020B0604020202020204" pitchFamily="34" charset="0"/>
+              <a:buChar char="•"/>
+            </a:pPr>
+            <a:r>
+              <a:rPr lang="en-IN" sz="2000" dirty="0"/>
+              <a:t>Images of different types of anti ad-blockers… </a:t>
+            </a:r>
+            <a:r>
+              <a:rPr lang="en-IN" sz="2000" dirty="0" err="1"/>
+              <a:t>BildSmart</a:t>
+            </a:r>
+            <a:r>
+              <a:rPr lang="en-IN" sz="2000" dirty="0"/>
+              <a:t>, </a:t>
+            </a:r>
+            <a:r>
+              <a:rPr lang="en-IN" sz="2000" dirty="0" err="1"/>
+              <a:t>YouPorn</a:t>
+            </a:r>
+            <a:r>
+              <a:rPr lang="en-IN" sz="2000" dirty="0"/>
+              <a:t>, Sport1.de</a:t>
+            </a:r>
+          </a:p>
+        </p:txBody>
+      </p:sp>
+      <p:sp>
+        <p:nvSpPr>
+          <p:cNvPr id="3" name="Titel 2"/>
+          <p:cNvSpPr>
+            <a:spLocks noGrp="1"/>
+          </p:cNvSpPr>
+          <p:nvPr>
+            <p:ph type="title"/>
+          </p:nvPr>
+        </p:nvSpPr>
+        <p:spPr>
+          <a:prstGeom prst="rect">
+            <a:avLst/>
+          </a:prstGeom>
+        </p:spPr>
+        <p:txBody>
+          <a:bodyPr/>
+          <a:lstStyle/>
+          <a:p>
+            <a:r>
+              <a:rPr lang="en-IN" sz="3000" dirty="0"/>
+              <a:t>Datasets and Results: Types of Anti Ad-blockers</a:t>
+            </a:r>
+            <a:endParaRPr lang="de-DE" sz="3000" dirty="0"/>
+          </a:p>
+        </p:txBody>
+      </p:sp>
+    </p:spTree>
+    <p:extLst>
+      <p:ext uri="{BB962C8B-B14F-4D97-AF65-F5344CB8AC3E}">
+        <p14:creationId xmlns:p14="http://schemas.microsoft.com/office/powerpoint/2010/main" val="2137792270"/>
+      </p:ext>
+    </p:extLst>
+  </p:cSld>
+  <p:clrMapOvr>
+    <a:masterClrMapping/>
+  </p:clrMapOvr>
+</p:sld>
+</file>
+
+<file path=ppt/slides/slide18.xml><?xml version="1.0" encoding="utf-8"?>
+<p:sld xmlns:a="http://schemas.openxmlformats.org/drawingml/2006/main" xmlns:r="http://schemas.openxmlformats.org/officeDocument/2006/relationships" xmlns:p="http://schemas.openxmlformats.org/presentationml/2006/main">
+  <p:cSld>
+    <p:spTree>
+      <p:nvGrpSpPr>
+        <p:cNvPr id="1" name=""/>
+        <p:cNvGrpSpPr/>
+        <p:nvPr/>
+      </p:nvGrpSpPr>
+      <p:grpSpPr>
+        <a:xfrm>
+          <a:off x="0" y="0"/>
+          <a:ext cx="0" cy="0"/>
+          <a:chOff x="0" y="0"/>
+          <a:chExt cx="0" cy="0"/>
+        </a:xfrm>
+      </p:grpSpPr>
+      <p:sp>
+        <p:nvSpPr>
+          <p:cNvPr id="2" name="Inhaltsplatzhalter 1"/>
+          <p:cNvSpPr>
+            <a:spLocks noGrp="1"/>
+          </p:cNvSpPr>
+          <p:nvPr>
+            <p:ph idx="1"/>
+          </p:nvPr>
+        </p:nvSpPr>
+        <p:spPr>
+          <a:xfrm>
+            <a:off x="319090" y="1762188"/>
+            <a:ext cx="8508999" cy="4436953"/>
+          </a:xfrm>
+        </p:spPr>
+        <p:txBody>
+          <a:bodyPr/>
+          <a:lstStyle/>
+          <a:p>
+            <a:pPr marL="342900" indent="-342900">
+              <a:lnSpc>
+                <a:spcPct val="100000"/>
+              </a:lnSpc>
+              <a:buFont typeface="Arial" panose="020B0604020202020204" pitchFamily="34" charset="0"/>
+              <a:buChar char="•"/>
+            </a:pPr>
+            <a:r>
+              <a:rPr lang="en-IN" sz="2000" dirty="0"/>
+              <a:t>Different categories….</a:t>
+            </a:r>
+          </a:p>
+        </p:txBody>
+      </p:sp>
+      <p:sp>
+        <p:nvSpPr>
+          <p:cNvPr id="3" name="Titel 2"/>
+          <p:cNvSpPr>
+            <a:spLocks noGrp="1"/>
+          </p:cNvSpPr>
+          <p:nvPr>
+            <p:ph type="title"/>
+          </p:nvPr>
+        </p:nvSpPr>
+        <p:spPr>
+          <a:prstGeom prst="rect">
+            <a:avLst/>
+          </a:prstGeom>
+        </p:spPr>
+        <p:txBody>
+          <a:bodyPr/>
+          <a:lstStyle/>
+          <a:p>
+            <a:r>
+              <a:rPr lang="en-IN" sz="3000" dirty="0"/>
+              <a:t>Datasets and Results: Categorization of Websites</a:t>
+            </a:r>
+            <a:endParaRPr lang="de-DE" sz="3000" dirty="0"/>
+          </a:p>
+        </p:txBody>
+      </p:sp>
+      <p:pic>
+        <p:nvPicPr>
+          <p:cNvPr id="5" name="Picture 4"/>
+          <p:cNvPicPr>
+            <a:picLocks noChangeAspect="1"/>
+          </p:cNvPicPr>
+          <p:nvPr/>
+        </p:nvPicPr>
+        <p:blipFill>
+          <a:blip r:embed="rId2"/>
+          <a:stretch>
+            <a:fillRect/>
+          </a:stretch>
+        </p:blipFill>
+        <p:spPr>
+          <a:xfrm>
+            <a:off x="1560359" y="2554648"/>
+            <a:ext cx="6026460" cy="3321221"/>
+          </a:xfrm>
+          <a:prstGeom prst="rect">
+            <a:avLst/>
+          </a:prstGeom>
+        </p:spPr>
+      </p:pic>
+    </p:spTree>
+    <p:extLst>
+      <p:ext uri="{BB962C8B-B14F-4D97-AF65-F5344CB8AC3E}">
+        <p14:creationId xmlns:p14="http://schemas.microsoft.com/office/powerpoint/2010/main" val="2846671940"/>
+      </p:ext>
+    </p:extLst>
+  </p:cSld>
+  <p:clrMapOvr>
+    <a:masterClrMapping/>
+  </p:clrMapOvr>
+</p:sld>
+</file>
+
+<file path=ppt/slides/slide19.xml><?xml version="1.0" encoding="utf-8"?>
+<p:sld xmlns:a="http://schemas.openxmlformats.org/drawingml/2006/main" xmlns:r="http://schemas.openxmlformats.org/officeDocument/2006/relationships" xmlns:p="http://schemas.openxmlformats.org/presentationml/2006/main">
+  <p:cSld>
+    <p:spTree>
+      <p:nvGrpSpPr>
+        <p:cNvPr id="1" name=""/>
+        <p:cNvGrpSpPr/>
+        <p:nvPr/>
+      </p:nvGrpSpPr>
+      <p:grpSpPr>
+        <a:xfrm>
+          <a:off x="0" y="0"/>
+          <a:ext cx="0" cy="0"/>
+          <a:chOff x="0" y="0"/>
+          <a:chExt cx="0" cy="0"/>
+        </a:xfrm>
+      </p:grpSpPr>
+      <p:sp>
+        <p:nvSpPr>
+          <p:cNvPr id="2" name="Inhaltsplatzhalter 1"/>
+          <p:cNvSpPr>
+            <a:spLocks noGrp="1"/>
+          </p:cNvSpPr>
+          <p:nvPr>
+            <p:ph idx="1"/>
+          </p:nvPr>
+        </p:nvSpPr>
+        <p:spPr>
+          <a:xfrm>
+            <a:off x="319090" y="1762188"/>
+            <a:ext cx="8508999" cy="4436953"/>
+          </a:xfrm>
+        </p:spPr>
+        <p:txBody>
+          <a:bodyPr/>
+          <a:lstStyle/>
+          <a:p>
+            <a:pPr marL="342900" indent="-342900">
+              <a:lnSpc>
+                <a:spcPct val="100000"/>
+              </a:lnSpc>
+              <a:buFont typeface="Arial" panose="020B0604020202020204" pitchFamily="34" charset="0"/>
+              <a:buChar char="•"/>
+            </a:pPr>
+            <a:r>
+              <a:rPr lang="en-IN" sz="2000" dirty="0"/>
+              <a:t>What are the limitations of our paper…</a:t>
+            </a:r>
+          </a:p>
+        </p:txBody>
+      </p:sp>
+      <p:sp>
+        <p:nvSpPr>
+          <p:cNvPr id="3" name="Titel 2"/>
+          <p:cNvSpPr>
+            <a:spLocks noGrp="1"/>
+          </p:cNvSpPr>
+          <p:nvPr>
+            <p:ph type="title"/>
+          </p:nvPr>
+        </p:nvSpPr>
+        <p:spPr>
+          <a:prstGeom prst="rect">
+            <a:avLst/>
+          </a:prstGeom>
+        </p:spPr>
+        <p:txBody>
+          <a:bodyPr/>
+          <a:lstStyle/>
+          <a:p>
+            <a:r>
+              <a:rPr lang="en-IN" sz="3000" dirty="0"/>
+              <a:t>Limitations</a:t>
+            </a:r>
+            <a:endParaRPr lang="de-DE" sz="3000" dirty="0"/>
+          </a:p>
+        </p:txBody>
+      </p:sp>
+    </p:spTree>
+    <p:extLst>
+      <p:ext uri="{BB962C8B-B14F-4D97-AF65-F5344CB8AC3E}">
+        <p14:creationId xmlns:p14="http://schemas.microsoft.com/office/powerpoint/2010/main" val="3776625192"/>
+      </p:ext>
+    </p:extLst>
   </p:cSld>
   <p:clrMapOvr>
     <a:masterClrMapping/>
@@ -8017,47 +8875,7 @@
             </a:pPr>
             <a:r>
               <a:rPr lang="en-IN" sz="2000" dirty="0"/>
-              <a:t>A</a:t>
-            </a:r>
-          </a:p>
-          <a:p>
-            <a:pPr marL="285750" indent="-285750">
-              <a:buFont typeface="Arial" panose="020B0604020202020204" pitchFamily="34" charset="0"/>
-              <a:buChar char="•"/>
-            </a:pPr>
-            <a:r>
-              <a:rPr lang="en-IN" sz="2000" dirty="0"/>
-              <a:t>B</a:t>
-            </a:r>
-          </a:p>
-          <a:p>
-            <a:pPr marL="285750" indent="-285750">
-              <a:buFont typeface="Arial" panose="020B0604020202020204" pitchFamily="34" charset="0"/>
-              <a:buChar char="•"/>
-            </a:pPr>
-            <a:r>
-              <a:rPr lang="en-IN" sz="2000" dirty="0"/>
-              <a:t>C</a:t>
-            </a:r>
-          </a:p>
-          <a:p>
-            <a:pPr marL="285750" indent="-285750">
-              <a:buFont typeface="Arial" panose="020B0604020202020204" pitchFamily="34" charset="0"/>
-              <a:buChar char="•"/>
-            </a:pPr>
-            <a:r>
-              <a:rPr lang="en-IN" sz="2000" dirty="0"/>
-              <a:t>D</a:t>
-            </a:r>
-          </a:p>
-          <a:p>
-            <a:pPr marL="285750" indent="-285750">
-              <a:buFont typeface="Arial" panose="020B0604020202020204" pitchFamily="34" charset="0"/>
-              <a:buChar char="•"/>
-            </a:pPr>
-            <a:r>
-              <a:rPr lang="en-IN" sz="2000" dirty="0"/>
-              <a:t>E</a:t>
+              <a:t>To be filled…</a:t>
             </a:r>
           </a:p>
           <a:p>
@@ -8104,6 +8922,1186 @@
         <p14:creationId xmlns:p14="http://schemas.microsoft.com/office/powerpoint/2010/main" val="1480529950"/>
       </p:ext>
     </p:extLst>
+  </p:cSld>
+  <p:clrMapOvr>
+    <a:masterClrMapping/>
+  </p:clrMapOvr>
+</p:sld>
+</file>
+
+<file path=ppt/slides/slide20.xml><?xml version="1.0" encoding="utf-8"?>
+<p:sld xmlns:a="http://schemas.openxmlformats.org/drawingml/2006/main" xmlns:r="http://schemas.openxmlformats.org/officeDocument/2006/relationships" xmlns:p="http://schemas.openxmlformats.org/presentationml/2006/main">
+  <p:cSld>
+    <p:spTree>
+      <p:nvGrpSpPr>
+        <p:cNvPr id="1" name=""/>
+        <p:cNvGrpSpPr/>
+        <p:nvPr/>
+      </p:nvGrpSpPr>
+      <p:grpSpPr>
+        <a:xfrm>
+          <a:off x="0" y="0"/>
+          <a:ext cx="0" cy="0"/>
+          <a:chOff x="0" y="0"/>
+          <a:chExt cx="0" cy="0"/>
+        </a:xfrm>
+      </p:grpSpPr>
+      <p:sp>
+        <p:nvSpPr>
+          <p:cNvPr id="2" name="Inhaltsplatzhalter 1"/>
+          <p:cNvSpPr>
+            <a:spLocks noGrp="1"/>
+          </p:cNvSpPr>
+          <p:nvPr>
+            <p:ph idx="1"/>
+          </p:nvPr>
+        </p:nvSpPr>
+        <p:spPr>
+          <a:xfrm>
+            <a:off x="319090" y="1762188"/>
+            <a:ext cx="8508999" cy="4436953"/>
+          </a:xfrm>
+        </p:spPr>
+        <p:txBody>
+          <a:bodyPr/>
+          <a:lstStyle/>
+          <a:p>
+            <a:pPr marL="342900" indent="-342900">
+              <a:lnSpc>
+                <a:spcPct val="100000"/>
+              </a:lnSpc>
+              <a:buFont typeface="Arial" panose="020B0604020202020204" pitchFamily="34" charset="0"/>
+              <a:buChar char="•"/>
+            </a:pPr>
+            <a:r>
+              <a:rPr lang="en-IN" sz="2000" dirty="0"/>
+              <a:t>First party script…</a:t>
+            </a:r>
+          </a:p>
+          <a:p>
+            <a:pPr marL="342900" indent="-342900">
+              <a:lnSpc>
+                <a:spcPct val="100000"/>
+              </a:lnSpc>
+              <a:buFont typeface="Arial" panose="020B0604020202020204" pitchFamily="34" charset="0"/>
+              <a:buChar char="•"/>
+            </a:pPr>
+            <a:endParaRPr lang="en-IN" sz="2000" dirty="0"/>
+          </a:p>
+          <a:p>
+            <a:pPr marL="342900" indent="-342900">
+              <a:lnSpc>
+                <a:spcPct val="100000"/>
+              </a:lnSpc>
+              <a:buFont typeface="Arial" panose="020B0604020202020204" pitchFamily="34" charset="0"/>
+              <a:buChar char="•"/>
+            </a:pPr>
+            <a:endParaRPr lang="en-IN" sz="2000" dirty="0"/>
+          </a:p>
+          <a:p>
+            <a:pPr marL="342900" indent="-342900">
+              <a:lnSpc>
+                <a:spcPct val="100000"/>
+              </a:lnSpc>
+              <a:buFont typeface="Arial" panose="020B0604020202020204" pitchFamily="34" charset="0"/>
+              <a:buChar char="•"/>
+            </a:pPr>
+            <a:endParaRPr lang="en-IN" sz="2000" dirty="0"/>
+          </a:p>
+          <a:p>
+            <a:pPr marL="342900" indent="-342900">
+              <a:lnSpc>
+                <a:spcPct val="100000"/>
+              </a:lnSpc>
+              <a:buFont typeface="Arial" panose="020B0604020202020204" pitchFamily="34" charset="0"/>
+              <a:buChar char="•"/>
+            </a:pPr>
+            <a:endParaRPr lang="en-IN" sz="2000" dirty="0"/>
+          </a:p>
+          <a:p>
+            <a:pPr marL="342900" indent="-342900">
+              <a:lnSpc>
+                <a:spcPct val="100000"/>
+              </a:lnSpc>
+              <a:buFont typeface="Arial" panose="020B0604020202020204" pitchFamily="34" charset="0"/>
+              <a:buChar char="•"/>
+            </a:pPr>
+            <a:endParaRPr lang="en-IN" sz="2000" dirty="0"/>
+          </a:p>
+          <a:p>
+            <a:pPr marL="342900" indent="-342900">
+              <a:lnSpc>
+                <a:spcPct val="100000"/>
+              </a:lnSpc>
+              <a:buFont typeface="Arial" panose="020B0604020202020204" pitchFamily="34" charset="0"/>
+              <a:buChar char="•"/>
+            </a:pPr>
+            <a:endParaRPr lang="en-IN" sz="2000" dirty="0"/>
+          </a:p>
+          <a:p>
+            <a:pPr marL="342900" indent="-342900">
+              <a:lnSpc>
+                <a:spcPct val="100000"/>
+              </a:lnSpc>
+              <a:buFont typeface="Arial" panose="020B0604020202020204" pitchFamily="34" charset="0"/>
+              <a:buChar char="•"/>
+            </a:pPr>
+            <a:endParaRPr lang="en-IN" sz="2000" dirty="0"/>
+          </a:p>
+          <a:p>
+            <a:pPr marL="342900" indent="-342900">
+              <a:lnSpc>
+                <a:spcPct val="100000"/>
+              </a:lnSpc>
+              <a:buFont typeface="Arial" panose="020B0604020202020204" pitchFamily="34" charset="0"/>
+              <a:buChar char="•"/>
+            </a:pPr>
+            <a:endParaRPr lang="en-IN" sz="2000" dirty="0"/>
+          </a:p>
+          <a:p>
+            <a:pPr>
+              <a:lnSpc>
+                <a:spcPct val="100000"/>
+              </a:lnSpc>
+            </a:pPr>
+            <a:endParaRPr lang="en-IN" sz="2000" dirty="0"/>
+          </a:p>
+        </p:txBody>
+      </p:sp>
+      <p:sp>
+        <p:nvSpPr>
+          <p:cNvPr id="3" name="Titel 2"/>
+          <p:cNvSpPr>
+            <a:spLocks noGrp="1"/>
+          </p:cNvSpPr>
+          <p:nvPr>
+            <p:ph type="title"/>
+          </p:nvPr>
+        </p:nvSpPr>
+        <p:spPr>
+          <a:prstGeom prst="rect">
+            <a:avLst/>
+          </a:prstGeom>
+        </p:spPr>
+        <p:txBody>
+          <a:bodyPr/>
+          <a:lstStyle/>
+          <a:p>
+            <a:r>
+              <a:rPr lang="en-IN" sz="3000" dirty="0"/>
+              <a:t>How Anti Ad-blocker scripts work</a:t>
+            </a:r>
+            <a:endParaRPr lang="de-DE" sz="3000" dirty="0"/>
+          </a:p>
+        </p:txBody>
+      </p:sp>
+      <p:pic>
+        <p:nvPicPr>
+          <p:cNvPr id="5" name="Picture 4"/>
+          <p:cNvPicPr>
+            <a:picLocks noChangeAspect="1"/>
+          </p:cNvPicPr>
+          <p:nvPr/>
+        </p:nvPicPr>
+        <p:blipFill>
+          <a:blip r:embed="rId2"/>
+          <a:stretch>
+            <a:fillRect/>
+          </a:stretch>
+        </p:blipFill>
+        <p:spPr>
+          <a:xfrm>
+            <a:off x="1411293" y="2382347"/>
+            <a:ext cx="5609332" cy="2309725"/>
+          </a:xfrm>
+          <a:prstGeom prst="rect">
+            <a:avLst/>
+          </a:prstGeom>
+        </p:spPr>
+      </p:pic>
+    </p:spTree>
+    <p:extLst>
+      <p:ext uri="{BB962C8B-B14F-4D97-AF65-F5344CB8AC3E}">
+        <p14:creationId xmlns:p14="http://schemas.microsoft.com/office/powerpoint/2010/main" val="421820293"/>
+      </p:ext>
+    </p:extLst>
+  </p:cSld>
+  <p:clrMapOvr>
+    <a:masterClrMapping/>
+  </p:clrMapOvr>
+</p:sld>
+</file>
+
+<file path=ppt/slides/slide21.xml><?xml version="1.0" encoding="utf-8"?>
+<p:sld xmlns:a="http://schemas.openxmlformats.org/drawingml/2006/main" xmlns:r="http://schemas.openxmlformats.org/officeDocument/2006/relationships" xmlns:p="http://schemas.openxmlformats.org/presentationml/2006/main">
+  <p:cSld>
+    <p:spTree>
+      <p:nvGrpSpPr>
+        <p:cNvPr id="1" name=""/>
+        <p:cNvGrpSpPr/>
+        <p:nvPr/>
+      </p:nvGrpSpPr>
+      <p:grpSpPr>
+        <a:xfrm>
+          <a:off x="0" y="0"/>
+          <a:ext cx="0" cy="0"/>
+          <a:chOff x="0" y="0"/>
+          <a:chExt cx="0" cy="0"/>
+        </a:xfrm>
+      </p:grpSpPr>
+      <p:sp>
+        <p:nvSpPr>
+          <p:cNvPr id="2" name="Inhaltsplatzhalter 1"/>
+          <p:cNvSpPr>
+            <a:spLocks noGrp="1"/>
+          </p:cNvSpPr>
+          <p:nvPr>
+            <p:ph idx="1"/>
+          </p:nvPr>
+        </p:nvSpPr>
+        <p:spPr>
+          <a:xfrm>
+            <a:off x="319090" y="1762188"/>
+            <a:ext cx="8508999" cy="4436953"/>
+          </a:xfrm>
+        </p:spPr>
+        <p:txBody>
+          <a:bodyPr/>
+          <a:lstStyle/>
+          <a:p>
+            <a:pPr marL="342900" indent="-342900">
+              <a:lnSpc>
+                <a:spcPct val="100000"/>
+              </a:lnSpc>
+              <a:buFont typeface="Arial" panose="020B0604020202020204" pitchFamily="34" charset="0"/>
+              <a:buChar char="•"/>
+            </a:pPr>
+            <a:r>
+              <a:rPr lang="en-IN" sz="2000" dirty="0"/>
+              <a:t>Third party script… Detection of extensions and multiple baits and timeouts</a:t>
+            </a:r>
+          </a:p>
+          <a:p>
+            <a:pPr marL="342900" indent="-342900">
+              <a:lnSpc>
+                <a:spcPct val="100000"/>
+              </a:lnSpc>
+              <a:buFont typeface="Arial" panose="020B0604020202020204" pitchFamily="34" charset="0"/>
+              <a:buChar char="•"/>
+            </a:pPr>
+            <a:endParaRPr lang="en-IN" sz="2000" dirty="0"/>
+          </a:p>
+          <a:p>
+            <a:pPr marL="342900" indent="-342900">
+              <a:lnSpc>
+                <a:spcPct val="100000"/>
+              </a:lnSpc>
+              <a:buFont typeface="Arial" panose="020B0604020202020204" pitchFamily="34" charset="0"/>
+              <a:buChar char="•"/>
+            </a:pPr>
+            <a:endParaRPr lang="en-IN" sz="2000" dirty="0"/>
+          </a:p>
+          <a:p>
+            <a:pPr marL="342900" indent="-342900">
+              <a:lnSpc>
+                <a:spcPct val="100000"/>
+              </a:lnSpc>
+              <a:buFont typeface="Arial" panose="020B0604020202020204" pitchFamily="34" charset="0"/>
+              <a:buChar char="•"/>
+            </a:pPr>
+            <a:endParaRPr lang="en-IN" sz="2000" dirty="0"/>
+          </a:p>
+          <a:p>
+            <a:pPr marL="342900" indent="-342900">
+              <a:lnSpc>
+                <a:spcPct val="100000"/>
+              </a:lnSpc>
+              <a:buFont typeface="Arial" panose="020B0604020202020204" pitchFamily="34" charset="0"/>
+              <a:buChar char="•"/>
+            </a:pPr>
+            <a:endParaRPr lang="en-IN" sz="2000" dirty="0"/>
+          </a:p>
+          <a:p>
+            <a:pPr marL="342900" indent="-342900">
+              <a:lnSpc>
+                <a:spcPct val="100000"/>
+              </a:lnSpc>
+              <a:buFont typeface="Arial" panose="020B0604020202020204" pitchFamily="34" charset="0"/>
+              <a:buChar char="•"/>
+            </a:pPr>
+            <a:endParaRPr lang="en-IN" sz="2000" dirty="0"/>
+          </a:p>
+          <a:p>
+            <a:pPr marL="342900" indent="-342900">
+              <a:lnSpc>
+                <a:spcPct val="100000"/>
+              </a:lnSpc>
+              <a:buFont typeface="Arial" panose="020B0604020202020204" pitchFamily="34" charset="0"/>
+              <a:buChar char="•"/>
+            </a:pPr>
+            <a:endParaRPr lang="en-IN" sz="2000" dirty="0"/>
+          </a:p>
+          <a:p>
+            <a:pPr marL="342900" indent="-342900">
+              <a:lnSpc>
+                <a:spcPct val="100000"/>
+              </a:lnSpc>
+              <a:buFont typeface="Arial" panose="020B0604020202020204" pitchFamily="34" charset="0"/>
+              <a:buChar char="•"/>
+            </a:pPr>
+            <a:endParaRPr lang="en-IN" sz="2000" dirty="0"/>
+          </a:p>
+          <a:p>
+            <a:pPr marL="342900" indent="-342900">
+              <a:lnSpc>
+                <a:spcPct val="100000"/>
+              </a:lnSpc>
+              <a:buFont typeface="Arial" panose="020B0604020202020204" pitchFamily="34" charset="0"/>
+              <a:buChar char="•"/>
+            </a:pPr>
+            <a:endParaRPr lang="en-IN" sz="2000" dirty="0"/>
+          </a:p>
+          <a:p>
+            <a:pPr marL="342900" indent="-342900">
+              <a:lnSpc>
+                <a:spcPct val="100000"/>
+              </a:lnSpc>
+              <a:buFont typeface="Arial" panose="020B0604020202020204" pitchFamily="34" charset="0"/>
+              <a:buChar char="•"/>
+            </a:pPr>
+            <a:endParaRPr lang="en-IN" sz="2000" dirty="0"/>
+          </a:p>
+          <a:p>
+            <a:pPr>
+              <a:lnSpc>
+                <a:spcPct val="100000"/>
+              </a:lnSpc>
+            </a:pPr>
+            <a:endParaRPr lang="en-IN" sz="2000" dirty="0"/>
+          </a:p>
+        </p:txBody>
+      </p:sp>
+      <p:sp>
+        <p:nvSpPr>
+          <p:cNvPr id="3" name="Titel 2"/>
+          <p:cNvSpPr>
+            <a:spLocks noGrp="1"/>
+          </p:cNvSpPr>
+          <p:nvPr>
+            <p:ph type="title"/>
+          </p:nvPr>
+        </p:nvSpPr>
+        <p:spPr>
+          <a:prstGeom prst="rect">
+            <a:avLst/>
+          </a:prstGeom>
+        </p:spPr>
+        <p:txBody>
+          <a:bodyPr/>
+          <a:lstStyle/>
+          <a:p>
+            <a:r>
+              <a:rPr lang="en-IN" sz="3000" dirty="0"/>
+              <a:t>How Anti Ad-blocker scripts work</a:t>
+            </a:r>
+            <a:endParaRPr lang="de-DE" sz="3000" dirty="0"/>
+          </a:p>
+        </p:txBody>
+      </p:sp>
+      <p:pic>
+        <p:nvPicPr>
+          <p:cNvPr id="6" name="Picture 5"/>
+          <p:cNvPicPr>
+            <a:picLocks noChangeAspect="1"/>
+          </p:cNvPicPr>
+          <p:nvPr/>
+        </p:nvPicPr>
+        <p:blipFill>
+          <a:blip r:embed="rId2"/>
+          <a:stretch>
+            <a:fillRect/>
+          </a:stretch>
+        </p:blipFill>
+        <p:spPr>
+          <a:xfrm>
+            <a:off x="1820981" y="3216180"/>
+            <a:ext cx="5170948" cy="2835207"/>
+          </a:xfrm>
+          <a:prstGeom prst="rect">
+            <a:avLst/>
+          </a:prstGeom>
+        </p:spPr>
+      </p:pic>
+    </p:spTree>
+    <p:extLst>
+      <p:ext uri="{BB962C8B-B14F-4D97-AF65-F5344CB8AC3E}">
+        <p14:creationId xmlns:p14="http://schemas.microsoft.com/office/powerpoint/2010/main" val="1278416786"/>
+      </p:ext>
+    </p:extLst>
+  </p:cSld>
+  <p:clrMapOvr>
+    <a:masterClrMapping/>
+  </p:clrMapOvr>
+</p:sld>
+</file>
+
+<file path=ppt/slides/slide22.xml><?xml version="1.0" encoding="utf-8"?>
+<p:sld xmlns:a="http://schemas.openxmlformats.org/drawingml/2006/main" xmlns:r="http://schemas.openxmlformats.org/officeDocument/2006/relationships" xmlns:p="http://schemas.openxmlformats.org/presentationml/2006/main">
+  <p:cSld>
+    <p:spTree>
+      <p:nvGrpSpPr>
+        <p:cNvPr id="1" name=""/>
+        <p:cNvGrpSpPr/>
+        <p:nvPr/>
+      </p:nvGrpSpPr>
+      <p:grpSpPr>
+        <a:xfrm>
+          <a:off x="0" y="0"/>
+          <a:ext cx="0" cy="0"/>
+          <a:chOff x="0" y="0"/>
+          <a:chExt cx="0" cy="0"/>
+        </a:xfrm>
+      </p:grpSpPr>
+      <p:sp>
+        <p:nvSpPr>
+          <p:cNvPr id="2" name="Inhaltsplatzhalter 1"/>
+          <p:cNvSpPr>
+            <a:spLocks noGrp="1"/>
+          </p:cNvSpPr>
+          <p:nvPr>
+            <p:ph idx="1"/>
+          </p:nvPr>
+        </p:nvSpPr>
+        <p:spPr>
+          <a:xfrm>
+            <a:off x="319090" y="1762188"/>
+            <a:ext cx="8508999" cy="4436953"/>
+          </a:xfrm>
+        </p:spPr>
+        <p:txBody>
+          <a:bodyPr/>
+          <a:lstStyle/>
+          <a:p>
+            <a:pPr marL="342900" indent="-342900">
+              <a:lnSpc>
+                <a:spcPct val="100000"/>
+              </a:lnSpc>
+              <a:buFont typeface="Arial" panose="020B0604020202020204" pitchFamily="34" charset="0"/>
+              <a:buChar char="•"/>
+            </a:pPr>
+            <a:r>
+              <a:rPr lang="en-IN" sz="2000" dirty="0"/>
+              <a:t>Placement</a:t>
+            </a:r>
+          </a:p>
+          <a:p>
+            <a:pPr marL="342900" indent="-342900">
+              <a:lnSpc>
+                <a:spcPct val="100000"/>
+              </a:lnSpc>
+              <a:buFont typeface="Arial" panose="020B0604020202020204" pitchFamily="34" charset="0"/>
+              <a:buChar char="•"/>
+            </a:pPr>
+            <a:r>
+              <a:rPr lang="en-IN" sz="2000" dirty="0"/>
+              <a:t>Detection</a:t>
+            </a:r>
+          </a:p>
+          <a:p>
+            <a:pPr marL="342900" indent="-342900">
+              <a:lnSpc>
+                <a:spcPct val="100000"/>
+              </a:lnSpc>
+              <a:buFont typeface="Arial" panose="020B0604020202020204" pitchFamily="34" charset="0"/>
+              <a:buChar char="•"/>
+            </a:pPr>
+            <a:r>
+              <a:rPr lang="en-IN" sz="2000" dirty="0"/>
+              <a:t>Size</a:t>
+            </a:r>
+          </a:p>
+        </p:txBody>
+      </p:sp>
+      <p:sp>
+        <p:nvSpPr>
+          <p:cNvPr id="3" name="Titel 2"/>
+          <p:cNvSpPr>
+            <a:spLocks noGrp="1"/>
+          </p:cNvSpPr>
+          <p:nvPr>
+            <p:ph type="title"/>
+          </p:nvPr>
+        </p:nvSpPr>
+        <p:spPr>
+          <a:prstGeom prst="rect">
+            <a:avLst/>
+          </a:prstGeom>
+        </p:spPr>
+        <p:txBody>
+          <a:bodyPr/>
+          <a:lstStyle/>
+          <a:p>
+            <a:r>
+              <a:rPr lang="en-IN" sz="3000" dirty="0"/>
+              <a:t>Anti Ad-blocker alternatives: Acceptable Ads</a:t>
+            </a:r>
+            <a:endParaRPr lang="de-DE" sz="3000" dirty="0"/>
+          </a:p>
+        </p:txBody>
+      </p:sp>
+    </p:spTree>
+    <p:extLst>
+      <p:ext uri="{BB962C8B-B14F-4D97-AF65-F5344CB8AC3E}">
+        <p14:creationId xmlns:p14="http://schemas.microsoft.com/office/powerpoint/2010/main" val="3262988065"/>
+      </p:ext>
+    </p:extLst>
+  </p:cSld>
+  <p:clrMapOvr>
+    <a:masterClrMapping/>
+  </p:clrMapOvr>
+</p:sld>
+</file>
+
+<file path=ppt/slides/slide23.xml><?xml version="1.0" encoding="utf-8"?>
+<p:sld xmlns:a="http://schemas.openxmlformats.org/drawingml/2006/main" xmlns:r="http://schemas.openxmlformats.org/officeDocument/2006/relationships" xmlns:p="http://schemas.openxmlformats.org/presentationml/2006/main">
+  <p:cSld>
+    <p:spTree>
+      <p:nvGrpSpPr>
+        <p:cNvPr id="1" name=""/>
+        <p:cNvGrpSpPr/>
+        <p:nvPr/>
+      </p:nvGrpSpPr>
+      <p:grpSpPr>
+        <a:xfrm>
+          <a:off x="0" y="0"/>
+          <a:ext cx="0" cy="0"/>
+          <a:chOff x="0" y="0"/>
+          <a:chExt cx="0" cy="0"/>
+        </a:xfrm>
+      </p:grpSpPr>
+      <p:sp>
+        <p:nvSpPr>
+          <p:cNvPr id="2" name="Inhaltsplatzhalter 1"/>
+          <p:cNvSpPr>
+            <a:spLocks noGrp="1"/>
+          </p:cNvSpPr>
+          <p:nvPr>
+            <p:ph idx="1"/>
+          </p:nvPr>
+        </p:nvSpPr>
+        <p:spPr>
+          <a:xfrm>
+            <a:off x="319090" y="1762188"/>
+            <a:ext cx="8508999" cy="4436953"/>
+          </a:xfrm>
+        </p:spPr>
+        <p:txBody>
+          <a:bodyPr/>
+          <a:lstStyle/>
+          <a:p>
+            <a:pPr marL="342900" indent="-342900">
+              <a:lnSpc>
+                <a:spcPct val="100000"/>
+              </a:lnSpc>
+              <a:buFont typeface="Arial" panose="020B0604020202020204" pitchFamily="34" charset="0"/>
+              <a:buChar char="•"/>
+            </a:pPr>
+            <a:r>
+              <a:rPr lang="en-IN" sz="2000" dirty="0"/>
+              <a:t>Whitelisting websites</a:t>
+            </a:r>
+          </a:p>
+        </p:txBody>
+      </p:sp>
+      <p:sp>
+        <p:nvSpPr>
+          <p:cNvPr id="3" name="Titel 2"/>
+          <p:cNvSpPr>
+            <a:spLocks noGrp="1"/>
+          </p:cNvSpPr>
+          <p:nvPr>
+            <p:ph type="title"/>
+          </p:nvPr>
+        </p:nvSpPr>
+        <p:spPr>
+          <a:prstGeom prst="rect">
+            <a:avLst/>
+          </a:prstGeom>
+        </p:spPr>
+        <p:txBody>
+          <a:bodyPr/>
+          <a:lstStyle/>
+          <a:p>
+            <a:r>
+              <a:rPr lang="en-IN" sz="3000" dirty="0"/>
+              <a:t>Anti Ad-blocker alternatives: Whitelists</a:t>
+            </a:r>
+            <a:endParaRPr lang="de-DE" sz="3000" dirty="0"/>
+          </a:p>
+        </p:txBody>
+      </p:sp>
+    </p:spTree>
+    <p:extLst>
+      <p:ext uri="{BB962C8B-B14F-4D97-AF65-F5344CB8AC3E}">
+        <p14:creationId xmlns:p14="http://schemas.microsoft.com/office/powerpoint/2010/main" val="1662875772"/>
+      </p:ext>
+    </p:extLst>
+  </p:cSld>
+  <p:clrMapOvr>
+    <a:masterClrMapping/>
+  </p:clrMapOvr>
+</p:sld>
+</file>
+
+<file path=ppt/slides/slide24.xml><?xml version="1.0" encoding="utf-8"?>
+<p:sld xmlns:a="http://schemas.openxmlformats.org/drawingml/2006/main" xmlns:r="http://schemas.openxmlformats.org/officeDocument/2006/relationships" xmlns:p="http://schemas.openxmlformats.org/presentationml/2006/main">
+  <p:cSld>
+    <p:spTree>
+      <p:nvGrpSpPr>
+        <p:cNvPr id="1" name=""/>
+        <p:cNvGrpSpPr/>
+        <p:nvPr/>
+      </p:nvGrpSpPr>
+      <p:grpSpPr>
+        <a:xfrm>
+          <a:off x="0" y="0"/>
+          <a:ext cx="0" cy="0"/>
+          <a:chOff x="0" y="0"/>
+          <a:chExt cx="0" cy="0"/>
+        </a:xfrm>
+      </p:grpSpPr>
+      <p:sp>
+        <p:nvSpPr>
+          <p:cNvPr id="2" name="Inhaltsplatzhalter 1"/>
+          <p:cNvSpPr>
+            <a:spLocks noGrp="1"/>
+          </p:cNvSpPr>
+          <p:nvPr>
+            <p:ph idx="1"/>
+          </p:nvPr>
+        </p:nvSpPr>
+        <p:spPr>
+          <a:xfrm>
+            <a:off x="319090" y="1762188"/>
+            <a:ext cx="8508999" cy="4436953"/>
+          </a:xfrm>
+        </p:spPr>
+        <p:txBody>
+          <a:bodyPr/>
+          <a:lstStyle/>
+          <a:p>
+            <a:pPr marL="342900" indent="-342900">
+              <a:lnSpc>
+                <a:spcPct val="100000"/>
+              </a:lnSpc>
+              <a:buFont typeface="Arial" panose="020B0604020202020204" pitchFamily="34" charset="0"/>
+              <a:buChar char="•"/>
+            </a:pPr>
+            <a:r>
+              <a:rPr lang="en-IN" sz="2000" dirty="0"/>
+              <a:t>Anti Ad-block killers like AAK are composed of a user script </a:t>
+            </a:r>
+            <a:r>
+              <a:rPr lang="en-IN" sz="2000" dirty="0" err="1"/>
+              <a:t>AakScript</a:t>
+            </a:r>
+            <a:r>
+              <a:rPr lang="en-IN" sz="2000" dirty="0"/>
+              <a:t> written in JavaScript and a filter list </a:t>
+            </a:r>
+            <a:r>
+              <a:rPr lang="en-IN" sz="2000" dirty="0" err="1"/>
+              <a:t>AakList</a:t>
+            </a:r>
+            <a:r>
+              <a:rPr lang="en-IN" sz="2000" dirty="0"/>
+              <a:t> using the same syntax as filter lists of </a:t>
+            </a:r>
+            <a:r>
+              <a:rPr lang="en-IN" sz="2000" dirty="0" err="1"/>
+              <a:t>AdBlock</a:t>
+            </a:r>
+            <a:r>
+              <a:rPr lang="en-IN" sz="2000" dirty="0"/>
+              <a:t> and </a:t>
+            </a:r>
+            <a:r>
+              <a:rPr lang="en-IN" sz="2000" dirty="0" err="1"/>
+              <a:t>AdBlock</a:t>
+            </a:r>
+            <a:r>
+              <a:rPr lang="en-IN" sz="2000" dirty="0"/>
+              <a:t> Plus….</a:t>
+            </a:r>
+          </a:p>
+        </p:txBody>
+      </p:sp>
+      <p:sp>
+        <p:nvSpPr>
+          <p:cNvPr id="3" name="Titel 2"/>
+          <p:cNvSpPr>
+            <a:spLocks noGrp="1"/>
+          </p:cNvSpPr>
+          <p:nvPr>
+            <p:ph type="title"/>
+          </p:nvPr>
+        </p:nvSpPr>
+        <p:spPr>
+          <a:prstGeom prst="rect">
+            <a:avLst/>
+          </a:prstGeom>
+        </p:spPr>
+        <p:txBody>
+          <a:bodyPr/>
+          <a:lstStyle/>
+          <a:p>
+            <a:r>
+              <a:rPr lang="en-IN" sz="3000" dirty="0"/>
+              <a:t>Anti Ad-blocker killers</a:t>
+            </a:r>
+            <a:endParaRPr lang="de-DE" sz="3000" dirty="0"/>
+          </a:p>
+        </p:txBody>
+      </p:sp>
+    </p:spTree>
+    <p:extLst>
+      <p:ext uri="{BB962C8B-B14F-4D97-AF65-F5344CB8AC3E}">
+        <p14:creationId xmlns:p14="http://schemas.microsoft.com/office/powerpoint/2010/main" val="2626069857"/>
+      </p:ext>
+    </p:extLst>
+  </p:cSld>
+  <p:clrMapOvr>
+    <a:masterClrMapping/>
+  </p:clrMapOvr>
+</p:sld>
+</file>
+
+<file path=ppt/slides/slide25.xml><?xml version="1.0" encoding="utf-8"?>
+<p:sld xmlns:a="http://schemas.openxmlformats.org/drawingml/2006/main" xmlns:r="http://schemas.openxmlformats.org/officeDocument/2006/relationships" xmlns:p="http://schemas.openxmlformats.org/presentationml/2006/main">
+  <p:cSld>
+    <p:spTree>
+      <p:nvGrpSpPr>
+        <p:cNvPr id="1" name=""/>
+        <p:cNvGrpSpPr/>
+        <p:nvPr/>
+      </p:nvGrpSpPr>
+      <p:grpSpPr>
+        <a:xfrm>
+          <a:off x="0" y="0"/>
+          <a:ext cx="0" cy="0"/>
+          <a:chOff x="0" y="0"/>
+          <a:chExt cx="0" cy="0"/>
+        </a:xfrm>
+      </p:grpSpPr>
+      <p:sp>
+        <p:nvSpPr>
+          <p:cNvPr id="2" name="Inhaltsplatzhalter 1"/>
+          <p:cNvSpPr>
+            <a:spLocks noGrp="1"/>
+          </p:cNvSpPr>
+          <p:nvPr>
+            <p:ph idx="1"/>
+          </p:nvPr>
+        </p:nvSpPr>
+        <p:spPr>
+          <a:xfrm>
+            <a:off x="319090" y="1762188"/>
+            <a:ext cx="8508999" cy="4436953"/>
+          </a:xfrm>
+        </p:spPr>
+        <p:txBody>
+          <a:bodyPr/>
+          <a:lstStyle/>
+          <a:p>
+            <a:pPr marL="342900" indent="-342900">
+              <a:lnSpc>
+                <a:spcPct val="100000"/>
+              </a:lnSpc>
+              <a:buFont typeface="Arial" panose="020B0604020202020204" pitchFamily="34" charset="0"/>
+              <a:buChar char="•"/>
+            </a:pPr>
+            <a:r>
+              <a:rPr lang="en-IN" sz="2000" dirty="0"/>
+              <a:t>Increasing transparency…</a:t>
+            </a:r>
+          </a:p>
+        </p:txBody>
+      </p:sp>
+      <p:sp>
+        <p:nvSpPr>
+          <p:cNvPr id="3" name="Titel 2"/>
+          <p:cNvSpPr>
+            <a:spLocks noGrp="1"/>
+          </p:cNvSpPr>
+          <p:nvPr>
+            <p:ph type="title"/>
+          </p:nvPr>
+        </p:nvSpPr>
+        <p:spPr>
+          <a:prstGeom prst="rect">
+            <a:avLst/>
+          </a:prstGeom>
+        </p:spPr>
+        <p:txBody>
+          <a:bodyPr/>
+          <a:lstStyle/>
+          <a:p>
+            <a:r>
+              <a:rPr lang="en-IN" dirty="0"/>
+              <a:t>Anti Ad-blockers: Ethical aspect</a:t>
+            </a:r>
+            <a:endParaRPr lang="de-DE" sz="3000" dirty="0"/>
+          </a:p>
+        </p:txBody>
+      </p:sp>
+    </p:spTree>
+    <p:extLst>
+      <p:ext uri="{BB962C8B-B14F-4D97-AF65-F5344CB8AC3E}">
+        <p14:creationId xmlns:p14="http://schemas.microsoft.com/office/powerpoint/2010/main" val="3028753127"/>
+      </p:ext>
+    </p:extLst>
+  </p:cSld>
+  <p:clrMapOvr>
+    <a:masterClrMapping/>
+  </p:clrMapOvr>
+</p:sld>
+</file>
+
+<file path=ppt/slides/slide26.xml><?xml version="1.0" encoding="utf-8"?>
+<p:sld xmlns:a="http://schemas.openxmlformats.org/drawingml/2006/main" xmlns:r="http://schemas.openxmlformats.org/officeDocument/2006/relationships" xmlns:p="http://schemas.openxmlformats.org/presentationml/2006/main">
+  <p:cSld>
+    <p:spTree>
+      <p:nvGrpSpPr>
+        <p:cNvPr id="1" name=""/>
+        <p:cNvGrpSpPr/>
+        <p:nvPr/>
+      </p:nvGrpSpPr>
+      <p:grpSpPr>
+        <a:xfrm>
+          <a:off x="0" y="0"/>
+          <a:ext cx="0" cy="0"/>
+          <a:chOff x="0" y="0"/>
+          <a:chExt cx="0" cy="0"/>
+        </a:xfrm>
+      </p:grpSpPr>
+      <p:sp>
+        <p:nvSpPr>
+          <p:cNvPr id="2" name="Inhaltsplatzhalter 1"/>
+          <p:cNvSpPr>
+            <a:spLocks noGrp="1"/>
+          </p:cNvSpPr>
+          <p:nvPr>
+            <p:ph idx="1"/>
+          </p:nvPr>
+        </p:nvSpPr>
+        <p:spPr>
+          <a:xfrm>
+            <a:off x="319090" y="1762188"/>
+            <a:ext cx="8508999" cy="4436953"/>
+          </a:xfrm>
+        </p:spPr>
+        <p:txBody>
+          <a:bodyPr/>
+          <a:lstStyle/>
+          <a:p>
+            <a:pPr marL="342900" indent="-342900">
+              <a:lnSpc>
+                <a:spcPct val="100000"/>
+              </a:lnSpc>
+              <a:buFont typeface="Arial" panose="020B0604020202020204" pitchFamily="34" charset="0"/>
+              <a:buChar char="•"/>
+            </a:pPr>
+            <a:r>
+              <a:rPr lang="en-IN" sz="2000" dirty="0"/>
+              <a:t>The Munich higher regional court also noted that the software did not violate any competition laws in Germany, with </a:t>
+            </a:r>
+            <a:r>
+              <a:rPr lang="en-IN" sz="2000" dirty="0" err="1"/>
+              <a:t>Eyeo's</a:t>
+            </a:r>
+            <a:r>
+              <a:rPr lang="en-IN" sz="2000" dirty="0"/>
+              <a:t> business model not qualifying as "forbidden aggressive advertising“….</a:t>
+            </a:r>
+          </a:p>
+          <a:p>
+            <a:pPr marL="342900" indent="-342900">
+              <a:lnSpc>
+                <a:spcPct val="100000"/>
+              </a:lnSpc>
+              <a:buFont typeface="Arial" panose="020B0604020202020204" pitchFamily="34" charset="0"/>
+              <a:buChar char="•"/>
+            </a:pPr>
+            <a:endParaRPr lang="en-IN" sz="2000" dirty="0"/>
+          </a:p>
+          <a:p>
+            <a:pPr marL="342900" indent="-342900">
+              <a:lnSpc>
+                <a:spcPct val="100000"/>
+              </a:lnSpc>
+              <a:buFont typeface="Arial" panose="020B0604020202020204" pitchFamily="34" charset="0"/>
+              <a:buChar char="•"/>
+            </a:pPr>
+            <a:r>
+              <a:rPr lang="en-IN" sz="2000" dirty="0"/>
+              <a:t>It is legal!!!</a:t>
+            </a:r>
+          </a:p>
+        </p:txBody>
+      </p:sp>
+      <p:sp>
+        <p:nvSpPr>
+          <p:cNvPr id="3" name="Titel 2"/>
+          <p:cNvSpPr>
+            <a:spLocks noGrp="1"/>
+          </p:cNvSpPr>
+          <p:nvPr>
+            <p:ph type="title"/>
+          </p:nvPr>
+        </p:nvSpPr>
+        <p:spPr>
+          <a:prstGeom prst="rect">
+            <a:avLst/>
+          </a:prstGeom>
+        </p:spPr>
+        <p:txBody>
+          <a:bodyPr/>
+          <a:lstStyle/>
+          <a:p>
+            <a:r>
+              <a:rPr lang="en-IN" dirty="0"/>
+              <a:t>Anti Ad-blockers: Legality in Germany</a:t>
+            </a:r>
+            <a:endParaRPr lang="de-DE" sz="3000" dirty="0"/>
+          </a:p>
+        </p:txBody>
+      </p:sp>
+    </p:spTree>
+    <p:extLst>
+      <p:ext uri="{BB962C8B-B14F-4D97-AF65-F5344CB8AC3E}">
+        <p14:creationId xmlns:p14="http://schemas.microsoft.com/office/powerpoint/2010/main" val="4096726837"/>
+      </p:ext>
+    </p:extLst>
+  </p:cSld>
+  <p:clrMapOvr>
+    <a:masterClrMapping/>
+  </p:clrMapOvr>
+</p:sld>
+</file>
+
+<file path=ppt/slides/slide27.xml><?xml version="1.0" encoding="utf-8"?>
+<p:sld xmlns:a="http://schemas.openxmlformats.org/drawingml/2006/main" xmlns:r="http://schemas.openxmlformats.org/officeDocument/2006/relationships" xmlns:p="http://schemas.openxmlformats.org/presentationml/2006/main">
+  <p:cSld>
+    <p:spTree>
+      <p:nvGrpSpPr>
+        <p:cNvPr id="1" name=""/>
+        <p:cNvGrpSpPr/>
+        <p:nvPr/>
+      </p:nvGrpSpPr>
+      <p:grpSpPr>
+        <a:xfrm>
+          <a:off x="0" y="0"/>
+          <a:ext cx="0" cy="0"/>
+          <a:chOff x="0" y="0"/>
+          <a:chExt cx="0" cy="0"/>
+        </a:xfrm>
+      </p:grpSpPr>
+      <p:sp>
+        <p:nvSpPr>
+          <p:cNvPr id="2" name="Inhaltsplatzhalter 1"/>
+          <p:cNvSpPr>
+            <a:spLocks noGrp="1"/>
+          </p:cNvSpPr>
+          <p:nvPr>
+            <p:ph idx="1"/>
+          </p:nvPr>
+        </p:nvSpPr>
+        <p:spPr>
+          <a:xfrm>
+            <a:off x="319090" y="1762188"/>
+            <a:ext cx="8508999" cy="4436953"/>
+          </a:xfrm>
+        </p:spPr>
+        <p:txBody>
+          <a:bodyPr/>
+          <a:lstStyle/>
+          <a:p>
+            <a:pPr marL="342900" indent="-342900">
+              <a:lnSpc>
+                <a:spcPct val="100000"/>
+              </a:lnSpc>
+              <a:buFont typeface="Arial" panose="020B0604020202020204" pitchFamily="34" charset="0"/>
+              <a:buChar char="•"/>
+            </a:pPr>
+            <a:r>
+              <a:rPr lang="en-IN" sz="2000" dirty="0"/>
+              <a:t>Which classifier best?</a:t>
+            </a:r>
+          </a:p>
+          <a:p>
+            <a:pPr marL="342900" indent="-342900">
+              <a:lnSpc>
+                <a:spcPct val="100000"/>
+              </a:lnSpc>
+              <a:buFont typeface="Arial" panose="020B0604020202020204" pitchFamily="34" charset="0"/>
+              <a:buChar char="•"/>
+            </a:pPr>
+            <a:endParaRPr lang="en-IN" sz="2000" dirty="0"/>
+          </a:p>
+          <a:p>
+            <a:pPr marL="342900" indent="-342900">
+              <a:lnSpc>
+                <a:spcPct val="100000"/>
+              </a:lnSpc>
+              <a:buFont typeface="Arial" panose="020B0604020202020204" pitchFamily="34" charset="0"/>
+              <a:buChar char="•"/>
+            </a:pPr>
+            <a:r>
+              <a:rPr lang="en-IN" sz="2000" dirty="0"/>
+              <a:t>Bias in selecting websites for Germany.</a:t>
+            </a:r>
+          </a:p>
+          <a:p>
+            <a:pPr marL="342900" indent="-342900">
+              <a:lnSpc>
+                <a:spcPct val="100000"/>
+              </a:lnSpc>
+              <a:buFont typeface="Arial" panose="020B0604020202020204" pitchFamily="34" charset="0"/>
+              <a:buChar char="•"/>
+            </a:pPr>
+            <a:endParaRPr lang="en-IN" sz="2000" dirty="0"/>
+          </a:p>
+          <a:p>
+            <a:pPr marL="342900" indent="-342900">
+              <a:lnSpc>
+                <a:spcPct val="100000"/>
+              </a:lnSpc>
+              <a:buFont typeface="Arial" panose="020B0604020202020204" pitchFamily="34" charset="0"/>
+              <a:buChar char="•"/>
+            </a:pPr>
+            <a:r>
+              <a:rPr lang="en-IN" sz="2000" dirty="0"/>
+              <a:t>Trend of Ad-blocker software usage.</a:t>
+            </a:r>
+          </a:p>
+          <a:p>
+            <a:pPr marL="342900" indent="-342900">
+              <a:lnSpc>
+                <a:spcPct val="100000"/>
+              </a:lnSpc>
+              <a:buFont typeface="Arial" panose="020B0604020202020204" pitchFamily="34" charset="0"/>
+              <a:buChar char="•"/>
+            </a:pPr>
+            <a:endParaRPr lang="en-IN" sz="2000" dirty="0"/>
+          </a:p>
+          <a:p>
+            <a:pPr marL="342900" indent="-342900">
+              <a:lnSpc>
+                <a:spcPct val="100000"/>
+              </a:lnSpc>
+              <a:buFont typeface="Arial" panose="020B0604020202020204" pitchFamily="34" charset="0"/>
+              <a:buChar char="•"/>
+            </a:pPr>
+            <a:r>
+              <a:rPr lang="en-IN" sz="2000" dirty="0"/>
+              <a:t>Legality in Germany.</a:t>
+            </a:r>
+          </a:p>
+          <a:p>
+            <a:pPr>
+              <a:lnSpc>
+                <a:spcPct val="100000"/>
+              </a:lnSpc>
+            </a:pPr>
+            <a:endParaRPr lang="en-IN" sz="2000" dirty="0"/>
+          </a:p>
+        </p:txBody>
+      </p:sp>
+      <p:sp>
+        <p:nvSpPr>
+          <p:cNvPr id="3" name="Titel 2"/>
+          <p:cNvSpPr>
+            <a:spLocks noGrp="1"/>
+          </p:cNvSpPr>
+          <p:nvPr>
+            <p:ph type="title"/>
+          </p:nvPr>
+        </p:nvSpPr>
+        <p:spPr>
+          <a:prstGeom prst="rect">
+            <a:avLst/>
+          </a:prstGeom>
+        </p:spPr>
+        <p:txBody>
+          <a:bodyPr/>
+          <a:lstStyle/>
+          <a:p>
+            <a:r>
+              <a:rPr lang="en-IN" dirty="0"/>
+              <a:t>Conclusion</a:t>
+            </a:r>
+            <a:endParaRPr lang="de-DE" sz="3000" dirty="0"/>
+          </a:p>
+        </p:txBody>
+      </p:sp>
+    </p:spTree>
+    <p:extLst>
+      <p:ext uri="{BB962C8B-B14F-4D97-AF65-F5344CB8AC3E}">
+        <p14:creationId xmlns:p14="http://schemas.microsoft.com/office/powerpoint/2010/main" val="2267394807"/>
+      </p:ext>
+    </p:extLst>
+  </p:cSld>
+  <p:clrMapOvr>
+    <a:masterClrMapping/>
+  </p:clrMapOvr>
+</p:sld>
+</file>
+
+<file path=ppt/slides/slide28.xml><?xml version="1.0" encoding="utf-8"?>
+<p:sld xmlns:a="http://schemas.openxmlformats.org/drawingml/2006/main" xmlns:r="http://schemas.openxmlformats.org/officeDocument/2006/relationships" xmlns:p="http://schemas.openxmlformats.org/presentationml/2006/main">
+  <p:cSld>
+    <p:spTree>
+      <p:nvGrpSpPr>
+        <p:cNvPr id="1" name=""/>
+        <p:cNvGrpSpPr/>
+        <p:nvPr/>
+      </p:nvGrpSpPr>
+      <p:grpSpPr>
+        <a:xfrm>
+          <a:off x="0" y="0"/>
+          <a:ext cx="0" cy="0"/>
+          <a:chOff x="0" y="0"/>
+          <a:chExt cx="0" cy="0"/>
+        </a:xfrm>
+      </p:grpSpPr>
+      <p:sp>
+        <p:nvSpPr>
+          <p:cNvPr id="5" name="Titel 4"/>
+          <p:cNvSpPr>
+            <a:spLocks noGrp="1"/>
+          </p:cNvSpPr>
+          <p:nvPr>
+            <p:ph type="title"/>
+          </p:nvPr>
+        </p:nvSpPr>
+        <p:spPr>
+          <a:xfrm>
+            <a:off x="1695945" y="3138444"/>
+            <a:ext cx="8508999" cy="501650"/>
+          </a:xfrm>
+        </p:spPr>
+        <p:txBody>
+          <a:bodyPr/>
+          <a:lstStyle/>
+          <a:p>
+            <a:r>
+              <a:rPr lang="en-IN" dirty="0"/>
+              <a:t>Thank you!</a:t>
+            </a:r>
+          </a:p>
+        </p:txBody>
+      </p:sp>
+    </p:spTree>
   </p:cSld>
   <p:clrMapOvr>
     <a:masterClrMapping/>
@@ -8304,7 +10302,7 @@
             </a:pPr>
             <a:r>
               <a:rPr lang="en-IN" sz="2000" dirty="0"/>
-              <a:t>We study the usage of Ad-blocker scripts and their mechanisms</a:t>
+              <a:t>We study the usage of Ad-blocker scripts and their mechanisms.</a:t>
             </a:r>
           </a:p>
           <a:p>
@@ -8317,7 +10315,7 @@
             </a:pPr>
             <a:r>
               <a:rPr lang="en-IN" sz="2000" dirty="0"/>
-              <a:t>We discuss the methodology used in detecting Anti Ad-blockers</a:t>
+              <a:t>We discuss the methodology used in detecting Anti Ad-blockers.</a:t>
             </a:r>
           </a:p>
           <a:p>
@@ -8330,7 +10328,7 @@
             </a:pPr>
             <a:r>
               <a:rPr lang="en-IN" sz="2000" dirty="0"/>
-              <a:t>We discuss on the findings of our results for the data set</a:t>
+              <a:t>We discuss on the findings of our results for the data set.</a:t>
             </a:r>
           </a:p>
           <a:p>
@@ -8343,7 +10341,7 @@
             </a:pPr>
             <a:r>
               <a:rPr lang="en-IN" sz="2000" dirty="0"/>
-              <a:t>We analyse Anti Ad-blocker scripts </a:t>
+              <a:t>We analyse Anti Ad-blocker scripts .</a:t>
             </a:r>
           </a:p>
           <a:p>
@@ -8356,7 +10354,7 @@
             </a:pPr>
             <a:r>
               <a:rPr lang="en-IN" sz="2000" dirty="0"/>
-              <a:t>We discuss the economic impact of Anti Ad-blockers</a:t>
+              <a:t>We discuss the economic impact of Anti Ad-blockers.</a:t>
             </a:r>
           </a:p>
           <a:p>
@@ -8369,7 +10367,7 @@
             </a:pPr>
             <a:r>
               <a:rPr lang="en-IN" sz="2000" dirty="0"/>
-              <a:t>We discuss the legality and ethical aspects of using Anti Ad-blockers</a:t>
+              <a:t>We discuss the legality and ethical aspects of using Anti Ad-blockers.</a:t>
             </a:r>
           </a:p>
           <a:p>
@@ -8382,7 +10380,7 @@
             </a:pPr>
             <a:r>
               <a:rPr lang="en-IN" sz="2000" dirty="0"/>
-              <a:t>We discuss alternatives to Anti Ad-blocking</a:t>
+              <a:t>We discuss alternatives to Anti Ad-blocking.</a:t>
             </a:r>
           </a:p>
           <a:p>
@@ -8488,7 +10486,7 @@
             </a:pPr>
             <a:r>
               <a:rPr lang="en-IN" sz="2000" dirty="0"/>
-              <a:t>U.S. lead the market share with $58.13b revenue in 2017 followed by the U.K. with $11.72b and China with $10.81b</a:t>
+              <a:t>U.S. lead the market share with $58.13b revenue in 2017 followed by the U.K. with $11.72b and China with $10.81b.</a:t>
             </a:r>
           </a:p>
           <a:p>
@@ -8849,7 +10847,7 @@
             </a:pPr>
             <a:r>
               <a:rPr lang="en-IN" sz="2000" dirty="0"/>
-              <a:t>Code showing how Forbes implements ads on their website</a:t>
+              <a:t>Code showing how Forbes implements ads on their website:</a:t>
             </a:r>
             <a:endParaRPr lang="en-IN" sz="1800" dirty="0"/>
           </a:p>
@@ -8962,7 +10960,7 @@
             </a:pPr>
             <a:r>
               <a:rPr lang="en-IN" sz="1800" dirty="0"/>
-              <a:t>Code showing how Forbes implements ad-blocker detection on their website</a:t>
+              <a:t>Code showing how Forbes implements ad-blocker detection on their website:</a:t>
             </a:r>
             <a:endParaRPr lang="en-IN" dirty="0"/>
           </a:p>

</xml_diff>

<commit_message>
Updating more slides for ppt.
</commit_message>
<xml_diff>
--- a/ppt/Seminar - Rohit & Rohit.pptx
+++ b/ppt/Seminar - Rohit & Rohit.pptx
@@ -31,8 +31,8 @@
     <p:sldId id="403" r:id="rId19"/>
     <p:sldId id="404" r:id="rId20"/>
     <p:sldId id="405" r:id="rId21"/>
-    <p:sldId id="406" r:id="rId22"/>
-    <p:sldId id="407" r:id="rId23"/>
+    <p:sldId id="418" r:id="rId22"/>
+    <p:sldId id="406" r:id="rId23"/>
     <p:sldId id="408" r:id="rId24"/>
     <p:sldId id="409" r:id="rId25"/>
     <p:sldId id="410" r:id="rId26"/>
@@ -578,7 +578,7 @@
               <a:pPr>
                 <a:defRPr/>
               </a:pPr>
-              <a:t>24/01/2018</a:t>
+              <a:t>25/01/2018</a:t>
             </a:fld>
             <a:endParaRPr lang="en-GB"/>
           </a:p>
@@ -8388,8 +8388,130 @@
             </a:pPr>
             <a:r>
               <a:rPr lang="en-IN" sz="2000" dirty="0"/>
-              <a:t>Which classifier is the best…</a:t>
-            </a:r>
+              <a:t>Our test set consisted of top ranked German websites from sources such as Alexa, </a:t>
+            </a:r>
+            <a:r>
+              <a:rPr lang="en-IN" sz="2000" dirty="0" err="1"/>
+              <a:t>Similarweb</a:t>
+            </a:r>
+            <a:r>
+              <a:rPr lang="en-IN" sz="2000" dirty="0"/>
+              <a:t>, </a:t>
+            </a:r>
+            <a:r>
+              <a:rPr lang="en-IN" sz="2000" dirty="0" err="1"/>
+              <a:t>Quantcast</a:t>
+            </a:r>
+            <a:r>
+              <a:rPr lang="en-IN" sz="2000" dirty="0"/>
+              <a:t> and TLD sites.</a:t>
+            </a:r>
+          </a:p>
+          <a:p>
+            <a:pPr marL="342900" indent="-342900">
+              <a:lnSpc>
+                <a:spcPct val="100000"/>
+              </a:lnSpc>
+              <a:buFont typeface="Arial" panose="020B0604020202020204" pitchFamily="34" charset="0"/>
+              <a:buChar char="•"/>
+            </a:pPr>
+            <a:endParaRPr lang="en-IN" sz="2000" dirty="0"/>
+          </a:p>
+          <a:p>
+            <a:pPr marL="342900" indent="-342900">
+              <a:lnSpc>
+                <a:spcPct val="100000"/>
+              </a:lnSpc>
+              <a:buFont typeface="Arial" panose="020B0604020202020204" pitchFamily="34" charset="0"/>
+              <a:buChar char="•"/>
+            </a:pPr>
+            <a:endParaRPr lang="en-IN" sz="2000" dirty="0"/>
+          </a:p>
+          <a:p>
+            <a:pPr marL="342900" indent="-342900">
+              <a:lnSpc>
+                <a:spcPct val="100000"/>
+              </a:lnSpc>
+              <a:buFont typeface="Arial" panose="020B0604020202020204" pitchFamily="34" charset="0"/>
+              <a:buChar char="•"/>
+            </a:pPr>
+            <a:endParaRPr lang="en-IN" sz="2000" dirty="0"/>
+          </a:p>
+          <a:p>
+            <a:pPr marL="342900" indent="-342900">
+              <a:lnSpc>
+                <a:spcPct val="100000"/>
+              </a:lnSpc>
+              <a:buFont typeface="Arial" panose="020B0604020202020204" pitchFamily="34" charset="0"/>
+              <a:buChar char="•"/>
+            </a:pPr>
+            <a:endParaRPr lang="en-IN" sz="2000" dirty="0"/>
+          </a:p>
+          <a:p>
+            <a:pPr marL="342900" indent="-342900">
+              <a:lnSpc>
+                <a:spcPct val="100000"/>
+              </a:lnSpc>
+              <a:buFont typeface="Arial" panose="020B0604020202020204" pitchFamily="34" charset="0"/>
+              <a:buChar char="•"/>
+            </a:pPr>
+            <a:endParaRPr lang="en-IN" sz="2000" dirty="0"/>
+          </a:p>
+          <a:p>
+            <a:pPr marL="342900" indent="-342900">
+              <a:lnSpc>
+                <a:spcPct val="100000"/>
+              </a:lnSpc>
+              <a:buFont typeface="Arial" panose="020B0604020202020204" pitchFamily="34" charset="0"/>
+              <a:buChar char="•"/>
+            </a:pPr>
+            <a:endParaRPr lang="en-IN" sz="2000" dirty="0"/>
+          </a:p>
+          <a:p>
+            <a:pPr marL="342900" indent="-342900">
+              <a:lnSpc>
+                <a:spcPct val="100000"/>
+              </a:lnSpc>
+              <a:buFont typeface="Arial" panose="020B0604020202020204" pitchFamily="34" charset="0"/>
+              <a:buChar char="•"/>
+            </a:pPr>
+            <a:r>
+              <a:rPr lang="en-IN" sz="2000" dirty="0"/>
+              <a:t>Close to 25 out of 1477 (1.7%) websites employ Ad-block detection.</a:t>
+            </a:r>
+          </a:p>
+          <a:p>
+            <a:pPr marL="342900" indent="-342900">
+              <a:lnSpc>
+                <a:spcPct val="100000"/>
+              </a:lnSpc>
+              <a:buFont typeface="Arial" panose="020B0604020202020204" pitchFamily="34" charset="0"/>
+              <a:buChar char="•"/>
+            </a:pPr>
+            <a:endParaRPr lang="en-IN" sz="2000" dirty="0"/>
+          </a:p>
+          <a:p>
+            <a:pPr marL="342900" indent="-342900">
+              <a:lnSpc>
+                <a:spcPct val="100000"/>
+              </a:lnSpc>
+              <a:buFont typeface="Arial" panose="020B0604020202020204" pitchFamily="34" charset="0"/>
+              <a:buChar char="•"/>
+            </a:pPr>
+            <a:r>
+              <a:rPr lang="en-IN" sz="2000" dirty="0"/>
+              <a:t>Certain websites still show advertisements or are allowed under Acceptable Ads programme.</a:t>
+            </a:r>
+          </a:p>
+          <a:p>
+            <a:pPr marL="342900" indent="-342900">
+              <a:lnSpc>
+                <a:spcPct val="100000"/>
+              </a:lnSpc>
+              <a:buFont typeface="Arial" panose="020B0604020202020204" pitchFamily="34" charset="0"/>
+              <a:buChar char="•"/>
+            </a:pPr>
+            <a:endParaRPr lang="en-IN" sz="2000" dirty="0"/>
           </a:p>
         </p:txBody>
       </p:sp>
@@ -8420,6 +8542,30 @@
           </a:p>
         </p:txBody>
       </p:sp>
+      <p:pic>
+        <p:nvPicPr>
+          <p:cNvPr id="5" name="Picture 4"/>
+          <p:cNvPicPr>
+            <a:picLocks noChangeAspect="1"/>
+          </p:cNvPicPr>
+          <p:nvPr/>
+        </p:nvPicPr>
+        <p:blipFill>
+          <a:blip r:embed="rId2"/>
+          <a:stretch>
+            <a:fillRect/>
+          </a:stretch>
+        </p:blipFill>
+        <p:spPr>
+          <a:xfrm>
+            <a:off x="1540059" y="2572300"/>
+            <a:ext cx="5562704" cy="1478694"/>
+          </a:xfrm>
+          <a:prstGeom prst="rect">
+            <a:avLst/>
+          </a:prstGeom>
+        </p:spPr>
+      </p:pic>
     </p:spTree>
     <p:extLst>
       <p:ext uri="{BB962C8B-B14F-4D97-AF65-F5344CB8AC3E}">
@@ -8452,40 +8598,6 @@
       </p:grpSpPr>
       <p:sp>
         <p:nvSpPr>
-          <p:cNvPr id="2" name="Inhaltsplatzhalter 1"/>
-          <p:cNvSpPr>
-            <a:spLocks noGrp="1"/>
-          </p:cNvSpPr>
-          <p:nvPr>
-            <p:ph idx="1"/>
-          </p:nvPr>
-        </p:nvSpPr>
-        <p:spPr>
-          <a:xfrm>
-            <a:off x="319090" y="1762188"/>
-            <a:ext cx="8508999" cy="4436953"/>
-          </a:xfrm>
-        </p:spPr>
-        <p:txBody>
-          <a:bodyPr/>
-          <a:lstStyle/>
-          <a:p>
-            <a:pPr marL="342900" indent="-342900">
-              <a:lnSpc>
-                <a:spcPct val="100000"/>
-              </a:lnSpc>
-              <a:buFont typeface="Arial" panose="020B0604020202020204" pitchFamily="34" charset="0"/>
-              <a:buChar char="•"/>
-            </a:pPr>
-            <a:r>
-              <a:rPr lang="en-IN" sz="2000" dirty="0"/>
-              <a:t>Germany vs US comparisons…</a:t>
-            </a:r>
-          </a:p>
-        </p:txBody>
-      </p:sp>
-      <p:sp>
-        <p:nvSpPr>
           <p:cNvPr id="3" name="Titel 2"/>
           <p:cNvSpPr>
             <a:spLocks noGrp="1"/>
@@ -8495,6 +8607,10 @@
           </p:nvPr>
         </p:nvSpPr>
         <p:spPr>
+          <a:xfrm>
+            <a:off x="319091" y="994334"/>
+            <a:ext cx="8206074" cy="410369"/>
+          </a:xfrm>
           <a:prstGeom prst="rect">
             <a:avLst/>
           </a:prstGeom>
@@ -8505,16 +8621,88 @@
           <a:p>
             <a:r>
               <a:rPr lang="en-IN" sz="3000" dirty="0"/>
-              <a:t>Datasets and Results: Geographical Comparison</a:t>
+              <a:t>Ad-block Detection Responses: Types</a:t>
             </a:r>
             <a:endParaRPr lang="de-DE" sz="3000" dirty="0"/>
           </a:p>
         </p:txBody>
       </p:sp>
+      <p:pic>
+        <p:nvPicPr>
+          <p:cNvPr id="6" name="Picture 5"/>
+          <p:cNvPicPr>
+            <a:picLocks noChangeAspect="1"/>
+          </p:cNvPicPr>
+          <p:nvPr/>
+        </p:nvPicPr>
+        <p:blipFill>
+          <a:blip r:embed="rId2"/>
+          <a:stretch>
+            <a:fillRect/>
+          </a:stretch>
+        </p:blipFill>
+        <p:spPr>
+          <a:xfrm>
+            <a:off x="489528" y="1724332"/>
+            <a:ext cx="3706380" cy="2475117"/>
+          </a:xfrm>
+          <a:prstGeom prst="rect">
+            <a:avLst/>
+          </a:prstGeom>
+        </p:spPr>
+      </p:pic>
+      <p:pic>
+        <p:nvPicPr>
+          <p:cNvPr id="10" name="Picture 9"/>
+          <p:cNvPicPr>
+            <a:picLocks noChangeAspect="1"/>
+          </p:cNvPicPr>
+          <p:nvPr/>
+        </p:nvPicPr>
+        <p:blipFill>
+          <a:blip r:embed="rId3"/>
+          <a:stretch>
+            <a:fillRect/>
+          </a:stretch>
+        </p:blipFill>
+        <p:spPr>
+          <a:xfrm>
+            <a:off x="4880938" y="1637581"/>
+            <a:ext cx="3496443" cy="2561869"/>
+          </a:xfrm>
+          <a:prstGeom prst="rect">
+            <a:avLst/>
+          </a:prstGeom>
+        </p:spPr>
+      </p:pic>
+      <p:pic>
+        <p:nvPicPr>
+          <p:cNvPr id="12" name="Picture 11"/>
+          <p:cNvPicPr>
+            <a:picLocks noChangeAspect="1"/>
+          </p:cNvPicPr>
+          <p:nvPr/>
+        </p:nvPicPr>
+        <p:blipFill>
+          <a:blip r:embed="rId4"/>
+          <a:stretch>
+            <a:fillRect/>
+          </a:stretch>
+        </p:blipFill>
+        <p:spPr>
+          <a:xfrm>
+            <a:off x="651601" y="4749088"/>
+            <a:ext cx="7725781" cy="1187385"/>
+          </a:xfrm>
+          <a:prstGeom prst="rect">
+            <a:avLst/>
+          </a:prstGeom>
+        </p:spPr>
+      </p:pic>
     </p:spTree>
     <p:extLst>
       <p:ext uri="{BB962C8B-B14F-4D97-AF65-F5344CB8AC3E}">
-        <p14:creationId xmlns:p14="http://schemas.microsoft.com/office/powerpoint/2010/main" val="2676196641"/>
+        <p14:creationId xmlns:p14="http://schemas.microsoft.com/office/powerpoint/2010/main" val="3977858435"/>
       </p:ext>
     </p:extLst>
   </p:cSld>
@@ -8570,23 +8758,99 @@
             </a:pPr>
             <a:r>
               <a:rPr lang="en-IN" sz="2000" dirty="0"/>
-              <a:t>Images of different types of anti ad-blockers… </a:t>
-            </a:r>
-            <a:r>
-              <a:rPr lang="en-IN" sz="2000" dirty="0" err="1"/>
-              <a:t>BildSmart</a:t>
-            </a:r>
+              <a:t>Our reference research paper focussed on Alexa top-100K websites that includes majority of U.S.A and China websites.</a:t>
+            </a:r>
+          </a:p>
+          <a:p>
+            <a:pPr marL="342900" indent="-342900">
+              <a:lnSpc>
+                <a:spcPct val="100000"/>
+              </a:lnSpc>
+              <a:buFont typeface="Arial" panose="020B0604020202020204" pitchFamily="34" charset="0"/>
+              <a:buChar char="•"/>
+            </a:pPr>
+            <a:endParaRPr lang="en-IN" sz="2000" dirty="0"/>
+          </a:p>
+          <a:p>
+            <a:pPr marL="342900" indent="-342900">
+              <a:lnSpc>
+                <a:spcPct val="100000"/>
+              </a:lnSpc>
+              <a:buFont typeface="Arial" panose="020B0604020202020204" pitchFamily="34" charset="0"/>
+              <a:buChar char="•"/>
+            </a:pPr>
             <a:r>
               <a:rPr lang="en-IN" sz="2000" dirty="0"/>
-              <a:t>, </a:t>
-            </a:r>
-            <a:r>
-              <a:rPr lang="en-IN" sz="2000" dirty="0" err="1"/>
-              <a:t>YouPorn</a:t>
-            </a:r>
+              <a:t>They found 686 websites in Alexa top-100K deploy Ad-blocker detection.</a:t>
+            </a:r>
+          </a:p>
+          <a:p>
+            <a:pPr marL="342900" indent="-342900">
+              <a:lnSpc>
+                <a:spcPct val="100000"/>
+              </a:lnSpc>
+              <a:buFont typeface="Arial" panose="020B0604020202020204" pitchFamily="34" charset="0"/>
+              <a:buChar char="•"/>
+            </a:pPr>
+            <a:endParaRPr lang="en-IN" sz="2000" dirty="0"/>
+          </a:p>
+          <a:p>
+            <a:pPr marL="342900" indent="-342900">
+              <a:lnSpc>
+                <a:spcPct val="100000"/>
+              </a:lnSpc>
+              <a:buFont typeface="Arial" panose="020B0604020202020204" pitchFamily="34" charset="0"/>
+              <a:buChar char="•"/>
+            </a:pPr>
             <a:r>
               <a:rPr lang="en-IN" sz="2000" dirty="0"/>
-              <a:t>, Sport1.de</a:t>
+              <a:t>Only Google Germany and Amazon Germany fall under the Alexa top-100 websites.</a:t>
+            </a:r>
+          </a:p>
+          <a:p>
+            <a:pPr marL="342900" indent="-342900">
+              <a:lnSpc>
+                <a:spcPct val="100000"/>
+              </a:lnSpc>
+              <a:buFont typeface="Arial" panose="020B0604020202020204" pitchFamily="34" charset="0"/>
+              <a:buChar char="•"/>
+            </a:pPr>
+            <a:endParaRPr lang="en-IN" sz="2000" dirty="0"/>
+          </a:p>
+          <a:p>
+            <a:pPr marL="342900" indent="-342900">
+              <a:lnSpc>
+                <a:spcPct val="100000"/>
+              </a:lnSpc>
+              <a:buFont typeface="Arial" panose="020B0604020202020204" pitchFamily="34" charset="0"/>
+              <a:buChar char="•"/>
+            </a:pPr>
+            <a:r>
+              <a:rPr lang="en-IN" sz="2000" dirty="0"/>
+              <a:t>In our analysis we found that 25 out of our 1477 test websites (top German websites) employ some kind of Ad-blocker detection.</a:t>
+            </a:r>
+          </a:p>
+          <a:p>
+            <a:pPr marL="342900" indent="-342900">
+              <a:lnSpc>
+                <a:spcPct val="100000"/>
+              </a:lnSpc>
+              <a:buFont typeface="Arial" panose="020B0604020202020204" pitchFamily="34" charset="0"/>
+              <a:buChar char="•"/>
+            </a:pPr>
+            <a:endParaRPr lang="en-IN" sz="2000" dirty="0"/>
+          </a:p>
+          <a:p>
+            <a:pPr marL="342900" indent="-342900">
+              <a:lnSpc>
+                <a:spcPct val="100000"/>
+              </a:lnSpc>
+              <a:buFont typeface="Arial" panose="020B0604020202020204" pitchFamily="34" charset="0"/>
+              <a:buChar char="•"/>
+            </a:pPr>
+            <a:r>
+              <a:rPr lang="en-IN" sz="2000" dirty="0"/>
+              <a:t>These analysis do not contain specific subpages of such websites and our methodology mostly relies on detecting changes in HTML content.</a:t>
             </a:r>
           </a:p>
         </p:txBody>
@@ -8612,7 +8876,7 @@
           <a:p>
             <a:r>
               <a:rPr lang="en-IN" sz="3000" dirty="0"/>
-              <a:t>Datasets and Results: Types of Anti Ad-blockers</a:t>
+              <a:t>Datasets and Results: Geographical Comparison</a:t>
             </a:r>
             <a:endParaRPr lang="de-DE" sz="3000" dirty="0"/>
           </a:p>
@@ -8621,7 +8885,7 @@
     </p:spTree>
     <p:extLst>
       <p:ext uri="{BB962C8B-B14F-4D97-AF65-F5344CB8AC3E}">
-        <p14:creationId xmlns:p14="http://schemas.microsoft.com/office/powerpoint/2010/main" val="2137792270"/>
+        <p14:creationId xmlns:p14="http://schemas.microsoft.com/office/powerpoint/2010/main" val="2676196641"/>
       </p:ext>
     </p:extLst>
   </p:cSld>
@@ -8677,7 +8941,7 @@
             </a:pPr>
             <a:r>
               <a:rPr lang="en-IN" sz="2000" dirty="0"/>
-              <a:t>Different categories….</a:t>
+              <a:t>Some of the top categories of websites deploying Ad-blocker detection:</a:t>
             </a:r>
           </a:p>
         </p:txBody>
@@ -8725,8 +8989,8 @@
         </p:blipFill>
         <p:spPr>
           <a:xfrm>
-            <a:off x="1560359" y="2554648"/>
-            <a:ext cx="6026460" cy="3321221"/>
+            <a:off x="1015412" y="2425339"/>
+            <a:ext cx="7057169" cy="3889251"/>
           </a:xfrm>
           <a:prstGeom prst="rect">
             <a:avLst/>
@@ -8792,7 +9056,115 @@
             </a:pPr>
             <a:r>
               <a:rPr lang="en-IN" sz="2000" dirty="0"/>
-              <a:t>What are the limitations of our paper…</a:t>
+              <a:t>The lack of information, including a limit of websites that Alexa provides by country for free, forced us to induce a bias by selecting TLD with “de”.</a:t>
+            </a:r>
+          </a:p>
+          <a:p>
+            <a:pPr marL="342900" indent="-342900">
+              <a:lnSpc>
+                <a:spcPct val="100000"/>
+              </a:lnSpc>
+              <a:buFont typeface="Arial" panose="020B0604020202020204" pitchFamily="34" charset="0"/>
+              <a:buChar char="•"/>
+            </a:pPr>
+            <a:endParaRPr lang="en-IN" sz="2000" dirty="0"/>
+          </a:p>
+          <a:p>
+            <a:pPr marL="342900" indent="-342900">
+              <a:lnSpc>
+                <a:spcPct val="100000"/>
+              </a:lnSpc>
+              <a:buFont typeface="Arial" panose="020B0604020202020204" pitchFamily="34" charset="0"/>
+              <a:buChar char="•"/>
+            </a:pPr>
+            <a:r>
+              <a:rPr lang="en-IN" sz="2000" dirty="0"/>
+              <a:t>Our methodology focusses on homepage of such websites.</a:t>
+            </a:r>
+          </a:p>
+          <a:p>
+            <a:pPr marL="342900" indent="-342900">
+              <a:lnSpc>
+                <a:spcPct val="100000"/>
+              </a:lnSpc>
+              <a:buFont typeface="Arial" panose="020B0604020202020204" pitchFamily="34" charset="0"/>
+              <a:buChar char="•"/>
+            </a:pPr>
+            <a:endParaRPr lang="en-IN" sz="2000" dirty="0"/>
+          </a:p>
+          <a:p>
+            <a:pPr marL="342900" indent="-342900">
+              <a:lnSpc>
+                <a:spcPct val="100000"/>
+              </a:lnSpc>
+              <a:buFont typeface="Arial" panose="020B0604020202020204" pitchFamily="34" charset="0"/>
+              <a:buChar char="•"/>
+            </a:pPr>
+            <a:r>
+              <a:rPr lang="en-IN" sz="2000" dirty="0"/>
+              <a:t>We remove any Anti Ad-block filters in </a:t>
+            </a:r>
+            <a:r>
+              <a:rPr lang="en-IN" sz="2000" dirty="0" err="1"/>
+              <a:t>EasyList</a:t>
+            </a:r>
+            <a:r>
+              <a:rPr lang="en-IN" sz="2000" dirty="0"/>
+              <a:t> for better detection. This may not be the default configuration used by users.</a:t>
+            </a:r>
+          </a:p>
+          <a:p>
+            <a:pPr marL="342900" indent="-342900">
+              <a:lnSpc>
+                <a:spcPct val="100000"/>
+              </a:lnSpc>
+              <a:buFont typeface="Arial" panose="020B0604020202020204" pitchFamily="34" charset="0"/>
+              <a:buChar char="•"/>
+            </a:pPr>
+            <a:endParaRPr lang="en-IN" sz="2000" dirty="0"/>
+          </a:p>
+          <a:p>
+            <a:pPr marL="342900" indent="-342900">
+              <a:lnSpc>
+                <a:spcPct val="100000"/>
+              </a:lnSpc>
+              <a:buFont typeface="Arial" panose="020B0604020202020204" pitchFamily="34" charset="0"/>
+              <a:buChar char="•"/>
+            </a:pPr>
+            <a:r>
+              <a:rPr lang="en-IN" sz="2000" dirty="0"/>
+              <a:t>We consider only HTML and textual changes to websites.</a:t>
+            </a:r>
+          </a:p>
+          <a:p>
+            <a:pPr marL="342900" indent="-342900">
+              <a:lnSpc>
+                <a:spcPct val="100000"/>
+              </a:lnSpc>
+              <a:buFont typeface="Arial" panose="020B0604020202020204" pitchFamily="34" charset="0"/>
+              <a:buChar char="•"/>
+            </a:pPr>
+            <a:endParaRPr lang="en-IN" sz="2000" dirty="0"/>
+          </a:p>
+          <a:p>
+            <a:pPr marL="342900" indent="-342900">
+              <a:lnSpc>
+                <a:spcPct val="100000"/>
+              </a:lnSpc>
+              <a:buFont typeface="Arial" panose="020B0604020202020204" pitchFamily="34" charset="0"/>
+              <a:buChar char="•"/>
+            </a:pPr>
+            <a:r>
+              <a:rPr lang="en-IN" sz="2000" dirty="0"/>
+              <a:t>Our focus is on </a:t>
+            </a:r>
+            <a:r>
+              <a:rPr lang="en-IN" sz="2000" dirty="0" err="1"/>
+              <a:t>Adblock</a:t>
+            </a:r>
+            <a:r>
+              <a:rPr lang="en-IN" sz="2000" dirty="0"/>
+              <a:t> Plus due to its popularity.</a:t>
             </a:r>
           </a:p>
         </p:txBody>
@@ -8975,7 +9347,7 @@
             </a:pPr>
             <a:r>
               <a:rPr lang="en-IN" sz="2000" dirty="0"/>
-              <a:t>First party script…</a:t>
+              <a:t>First party scripts either add a timing delay for displaying ads or add an empty &lt;div&gt; class as shown below. This acts as a bait.</a:t>
             </a:r>
           </a:p>
           <a:p>
@@ -9111,8 +9483,8 @@
         </p:blipFill>
         <p:spPr>
           <a:xfrm>
-            <a:off x="1411293" y="2382347"/>
-            <a:ext cx="5609332" cy="2309725"/>
+            <a:off x="1185712" y="2975016"/>
+            <a:ext cx="6775753" cy="2790016"/>
           </a:xfrm>
           <a:prstGeom prst="rect">
             <a:avLst/>
@@ -9178,7 +9550,54 @@
             </a:pPr>
             <a:r>
               <a:rPr lang="en-IN" sz="2000" dirty="0"/>
-              <a:t>Third party script… Detection of extensions and multiple baits and timeouts</a:t>
+              <a:t>Third party script detects various browser extensions such as </a:t>
+            </a:r>
+            <a:r>
+              <a:rPr lang="en-IN" sz="2000" dirty="0" err="1"/>
+              <a:t>adblock</a:t>
+            </a:r>
+            <a:r>
+              <a:rPr lang="en-IN" sz="2000" dirty="0"/>
+              <a:t>, </a:t>
+            </a:r>
+            <a:r>
+              <a:rPr lang="en-IN" sz="2000" dirty="0" err="1"/>
+              <a:t>adblock_plus</a:t>
+            </a:r>
+            <a:r>
+              <a:rPr lang="en-IN" sz="2000" dirty="0"/>
+              <a:t>, </a:t>
+            </a:r>
+            <a:r>
+              <a:rPr lang="en-IN" sz="2000" dirty="0" err="1"/>
+              <a:t>adblock_pro</a:t>
+            </a:r>
+            <a:r>
+              <a:rPr lang="en-IN" sz="2000" dirty="0"/>
+              <a:t>. </a:t>
+            </a:r>
+          </a:p>
+          <a:p>
+            <a:pPr marL="342900" indent="-342900">
+              <a:lnSpc>
+                <a:spcPct val="100000"/>
+              </a:lnSpc>
+              <a:buFont typeface="Arial" panose="020B0604020202020204" pitchFamily="34" charset="0"/>
+              <a:buChar char="•"/>
+            </a:pPr>
+            <a:endParaRPr lang="en-IN" sz="2000" dirty="0"/>
+          </a:p>
+          <a:p>
+            <a:pPr marL="342900" indent="-342900">
+              <a:lnSpc>
+                <a:spcPct val="100000"/>
+              </a:lnSpc>
+              <a:buFont typeface="Arial" panose="020B0604020202020204" pitchFamily="34" charset="0"/>
+              <a:buChar char="•"/>
+            </a:pPr>
+            <a:r>
+              <a:rPr lang="en-IN" sz="2000" dirty="0"/>
+              <a:t>Multiple baits and timeouts are used simultaneously. </a:t>
             </a:r>
           </a:p>
           <a:p>
@@ -9324,8 +9743,8 @@
         </p:blipFill>
         <p:spPr>
           <a:xfrm>
-            <a:off x="1820981" y="3216180"/>
-            <a:ext cx="5170948" cy="2835207"/>
+            <a:off x="1359163" y="3150333"/>
+            <a:ext cx="6212514" cy="3406293"/>
           </a:xfrm>
           <a:prstGeom prst="rect">
             <a:avLst/>
@@ -9384,40 +9803,112 @@
           <a:p>
             <a:pPr marL="342900" indent="-342900">
               <a:lnSpc>
-                <a:spcPct val="100000"/>
+                <a:spcPct val="150000"/>
               </a:lnSpc>
               <a:buFont typeface="Arial" panose="020B0604020202020204" pitchFamily="34" charset="0"/>
               <a:buChar char="•"/>
             </a:pPr>
             <a:r>
               <a:rPr lang="en-IN" sz="2000" dirty="0"/>
+              <a:t>Acceptable ads programme is provided by </a:t>
+            </a:r>
+            <a:r>
+              <a:rPr lang="en-IN" sz="2000" dirty="0" err="1"/>
+              <a:t>Adblock</a:t>
+            </a:r>
+            <a:r>
+              <a:rPr lang="en-IN" sz="2000" dirty="0"/>
+              <a:t> Plus for providing ads that do not disrupt or distort web content for users.</a:t>
+            </a:r>
+          </a:p>
+          <a:p>
+            <a:pPr marL="519113" lvl="1" indent="-342900">
+              <a:lnSpc>
+                <a:spcPct val="150000"/>
+              </a:lnSpc>
+              <a:buFont typeface="Arial" panose="020B0604020202020204" pitchFamily="34" charset="0"/>
+              <a:buChar char="•"/>
+            </a:pPr>
+            <a:r>
+              <a:rPr lang="en-IN" sz="2000" i="1" dirty="0"/>
               <a:t>Placement</a:t>
             </a:r>
+            <a:r>
+              <a:rPr lang="en-IN" sz="2000" dirty="0"/>
+              <a:t>: Ads must not disrupt the user’s natural reading flow. They must be placed on the top, side or below the Primary Content.</a:t>
+            </a:r>
+          </a:p>
+          <a:p>
+            <a:pPr marL="519113" lvl="1" indent="-342900">
+              <a:lnSpc>
+                <a:spcPct val="150000"/>
+              </a:lnSpc>
+              <a:buFont typeface="Arial" panose="020B0604020202020204" pitchFamily="34" charset="0"/>
+              <a:buChar char="•"/>
+            </a:pPr>
+            <a:r>
+              <a:rPr lang="en-IN" sz="2000" i="1" dirty="0"/>
+              <a:t>Distinction</a:t>
+            </a:r>
+            <a:r>
+              <a:rPr lang="en-IN" sz="2000" dirty="0"/>
+              <a:t>: Ads should not be mixed with any other content so that it overlaps with the Primary Content.</a:t>
+            </a:r>
+          </a:p>
+          <a:p>
+            <a:pPr marL="519113" lvl="1" indent="-342900">
+              <a:lnSpc>
+                <a:spcPct val="150000"/>
+              </a:lnSpc>
+              <a:buFont typeface="Arial" panose="020B0604020202020204" pitchFamily="34" charset="0"/>
+              <a:buChar char="•"/>
+            </a:pPr>
+            <a:r>
+              <a:rPr lang="en-IN" sz="2000" i="1" dirty="0"/>
+              <a:t>Size</a:t>
+            </a:r>
+            <a:r>
+              <a:rPr lang="en-IN" sz="2000" dirty="0"/>
+              <a:t>: A strict individual size requirement is placed for Acceptable Ads. </a:t>
+            </a:r>
+          </a:p>
+          <a:p>
+            <a:pPr marL="519113" lvl="1" indent="-342900">
+              <a:lnSpc>
+                <a:spcPct val="150000"/>
+              </a:lnSpc>
+              <a:buFont typeface="Arial" panose="020B0604020202020204" pitchFamily="34" charset="0"/>
+              <a:buChar char="•"/>
+            </a:pPr>
+            <a:endParaRPr lang="en-IN" sz="2000" dirty="0"/>
           </a:p>
           <a:p>
             <a:pPr marL="342900" indent="-342900">
               <a:lnSpc>
-                <a:spcPct val="100000"/>
+                <a:spcPct val="150000"/>
               </a:lnSpc>
               <a:buFont typeface="Arial" panose="020B0604020202020204" pitchFamily="34" charset="0"/>
               <a:buChar char="•"/>
             </a:pPr>
             <a:r>
               <a:rPr lang="en-IN" sz="2000" dirty="0"/>
-              <a:t>Detection</a:t>
-            </a:r>
-          </a:p>
-          <a:p>
-            <a:pPr marL="342900" indent="-342900">
-              <a:lnSpc>
-                <a:spcPct val="100000"/>
-              </a:lnSpc>
-              <a:buFont typeface="Arial" panose="020B0604020202020204" pitchFamily="34" charset="0"/>
-              <a:buChar char="•"/>
-            </a:pPr>
+              <a:t>Unacceptable ads include animated ads, </a:t>
+            </a:r>
+            <a:r>
+              <a:rPr lang="en-IN" sz="2000" dirty="0" err="1"/>
+              <a:t>autoplay</a:t>
+            </a:r>
             <a:r>
               <a:rPr lang="en-IN" sz="2000" dirty="0"/>
-              <a:t>Size</a:t>
+              <a:t>, expanding ads, pop-ups and pop-</a:t>
+            </a:r>
+            <a:r>
+              <a:rPr lang="en-IN" sz="2000" dirty="0" err="1"/>
+              <a:t>unders</a:t>
+            </a:r>
+            <a:r>
+              <a:rPr lang="en-IN" sz="2000" dirty="0"/>
+              <a:t>, rich media ads.</a:t>
             </a:r>
           </a:p>
         </p:txBody>
@@ -9501,14 +9992,72 @@
           <a:p>
             <a:pPr marL="342900" indent="-342900">
               <a:lnSpc>
-                <a:spcPct val="100000"/>
+                <a:spcPct val="150000"/>
               </a:lnSpc>
               <a:buFont typeface="Arial" panose="020B0604020202020204" pitchFamily="34" charset="0"/>
               <a:buChar char="•"/>
             </a:pPr>
             <a:r>
               <a:rPr lang="en-IN" sz="2000" dirty="0"/>
-              <a:t>Whitelisting websites</a:t>
+              <a:t>This is analogous to anti-viruses that allow certain </a:t>
+            </a:r>
+            <a:r>
+              <a:rPr lang="en-IN" sz="2000" dirty="0" err="1"/>
+              <a:t>softwares</a:t>
+            </a:r>
+            <a:r>
+              <a:rPr lang="en-IN" sz="2000" dirty="0"/>
+              <a:t> to run on the system.</a:t>
+            </a:r>
+          </a:p>
+          <a:p>
+            <a:pPr marL="342900" indent="-342900">
+              <a:lnSpc>
+                <a:spcPct val="150000"/>
+              </a:lnSpc>
+              <a:buFont typeface="Arial" panose="020B0604020202020204" pitchFamily="34" charset="0"/>
+              <a:buChar char="•"/>
+            </a:pPr>
+            <a:endParaRPr lang="en-IN" sz="2000" dirty="0"/>
+          </a:p>
+          <a:p>
+            <a:pPr marL="342900" indent="-342900">
+              <a:lnSpc>
+                <a:spcPct val="150000"/>
+              </a:lnSpc>
+              <a:buFont typeface="Arial" panose="020B0604020202020204" pitchFamily="34" charset="0"/>
+              <a:buChar char="•"/>
+            </a:pPr>
+            <a:r>
+              <a:rPr lang="en-IN" sz="2000" dirty="0" err="1"/>
+              <a:t>Adblock</a:t>
+            </a:r>
+            <a:r>
+              <a:rPr lang="en-IN" sz="2000" dirty="0"/>
+              <a:t> Plus charges high generating revenue sources for adding their websites to their whitelists while they do not charge for others.</a:t>
+            </a:r>
+          </a:p>
+          <a:p>
+            <a:pPr marL="342900" indent="-342900">
+              <a:lnSpc>
+                <a:spcPct val="150000"/>
+              </a:lnSpc>
+              <a:buFont typeface="Arial" panose="020B0604020202020204" pitchFamily="34" charset="0"/>
+              <a:buChar char="•"/>
+            </a:pPr>
+            <a:endParaRPr lang="en-IN" sz="2000" dirty="0"/>
+          </a:p>
+          <a:p>
+            <a:pPr marL="342900" indent="-342900">
+              <a:lnSpc>
+                <a:spcPct val="150000"/>
+              </a:lnSpc>
+              <a:buFont typeface="Arial" panose="020B0604020202020204" pitchFamily="34" charset="0"/>
+              <a:buChar char="•"/>
+            </a:pPr>
+            <a:r>
+              <a:rPr lang="en-IN" sz="2000" dirty="0"/>
+              <a:t>Some websites have started charging users for an ad-free version of their websites.</a:t>
             </a:r>
           </a:p>
         </p:txBody>
@@ -9592,14 +10141,37 @@
           <a:p>
             <a:pPr marL="342900" indent="-342900">
               <a:lnSpc>
-                <a:spcPct val="100000"/>
+                <a:spcPct val="150000"/>
               </a:lnSpc>
               <a:buFont typeface="Arial" panose="020B0604020202020204" pitchFamily="34" charset="0"/>
               <a:buChar char="•"/>
             </a:pPr>
             <a:r>
               <a:rPr lang="en-IN" sz="2000" dirty="0"/>
-              <a:t>Anti Ad-block killers like AAK are composed of a user script </a:t>
+              <a:t>Anti Ad-block killers tricks sites that use Anti Ad-blocker detection into thinking the user is not using an Ad-blocker.</a:t>
+            </a:r>
+          </a:p>
+          <a:p>
+            <a:pPr marL="342900" indent="-342900">
+              <a:lnSpc>
+                <a:spcPct val="150000"/>
+              </a:lnSpc>
+              <a:buFont typeface="Arial" panose="020B0604020202020204" pitchFamily="34" charset="0"/>
+              <a:buChar char="•"/>
+            </a:pPr>
+            <a:endParaRPr lang="en-IN" sz="2000" dirty="0"/>
+          </a:p>
+          <a:p>
+            <a:pPr marL="342900" indent="-342900">
+              <a:lnSpc>
+                <a:spcPct val="150000"/>
+              </a:lnSpc>
+              <a:buFont typeface="Arial" panose="020B0604020202020204" pitchFamily="34" charset="0"/>
+              <a:buChar char="•"/>
+            </a:pPr>
+            <a:r>
+              <a:rPr lang="en-IN" sz="2000" dirty="0"/>
+              <a:t>Anti Ad-block killers such as AAK are composed of a user script </a:t>
             </a:r>
             <a:r>
               <a:rPr lang="en-IN" sz="2000" dirty="0" err="1"/>
@@ -9615,7 +10187,7 @@
             </a:r>
             <a:r>
               <a:rPr lang="en-IN" sz="2000" dirty="0"/>
-              <a:t> using the same syntax as filter lists of </a:t>
+              <a:t> that use the same syntax as filter lists of </a:t>
             </a:r>
             <a:r>
               <a:rPr lang="en-IN" sz="2000" dirty="0" err="1"/>
@@ -9631,7 +10203,46 @@
             </a:r>
             <a:r>
               <a:rPr lang="en-IN" sz="2000" dirty="0"/>
-              <a:t> Plus….</a:t>
+              <a:t> Plus.</a:t>
+            </a:r>
+          </a:p>
+          <a:p>
+            <a:pPr marL="342900" indent="-342900">
+              <a:lnSpc>
+                <a:spcPct val="150000"/>
+              </a:lnSpc>
+              <a:buFont typeface="Arial" panose="020B0604020202020204" pitchFamily="34" charset="0"/>
+              <a:buChar char="•"/>
+            </a:pPr>
+            <a:endParaRPr lang="en-IN" sz="2000" dirty="0"/>
+          </a:p>
+          <a:p>
+            <a:pPr marL="342900" indent="-342900">
+              <a:lnSpc>
+                <a:spcPct val="150000"/>
+              </a:lnSpc>
+              <a:buFont typeface="Arial" panose="020B0604020202020204" pitchFamily="34" charset="0"/>
+              <a:buChar char="•"/>
+            </a:pPr>
+            <a:r>
+              <a:rPr lang="en-IN" sz="2000" dirty="0"/>
+              <a:t>Ad-blockers still continue to run as normal using script managers like </a:t>
+            </a:r>
+            <a:r>
+              <a:rPr lang="en-IN" sz="2000" dirty="0" err="1"/>
+              <a:t>Greasemonkey</a:t>
+            </a:r>
+            <a:r>
+              <a:rPr lang="en-IN" sz="2000" dirty="0"/>
+              <a:t> or </a:t>
+            </a:r>
+            <a:r>
+              <a:rPr lang="en-IN" sz="2000" dirty="0" err="1"/>
+              <a:t>Tampermonkey</a:t>
+            </a:r>
+            <a:r>
+              <a:rPr lang="en-IN" sz="2000" dirty="0"/>
+              <a:t>.</a:t>
             </a:r>
           </a:p>
         </p:txBody>
@@ -9657,7 +10268,11 @@
           <a:p>
             <a:r>
               <a:rPr lang="en-IN" sz="3000" dirty="0"/>
-              <a:t>Anti Ad-blocker killers</a:t>
+              <a:t>YES! Anti Ad-blocker killers als</a:t>
+            </a:r>
+            <a:r>
+              <a:rPr lang="en-IN" dirty="0"/>
+              <a:t>o exists!</a:t>
             </a:r>
             <a:endParaRPr lang="de-DE" sz="3000" dirty="0"/>
           </a:p>

</xml_diff>